<commit_message>
Upload android presentation file
</commit_message>
<xml_diff>
--- a/Android/Android.pptx
+++ b/Android/Android.pptx
@@ -10,8 +10,19 @@
     <p:sldId id="261" r:id="rId4"/>
     <p:sldId id="257" r:id="rId5"/>
     <p:sldId id="258" r:id="rId6"/>
-    <p:sldId id="259" r:id="rId7"/>
-    <p:sldId id="260" r:id="rId8"/>
+    <p:sldId id="263" r:id="rId7"/>
+    <p:sldId id="264" r:id="rId8"/>
+    <p:sldId id="265" r:id="rId9"/>
+    <p:sldId id="266" r:id="rId10"/>
+    <p:sldId id="267" r:id="rId11"/>
+    <p:sldId id="268" r:id="rId12"/>
+    <p:sldId id="269" r:id="rId13"/>
+    <p:sldId id="270" r:id="rId14"/>
+    <p:sldId id="271" r:id="rId15"/>
+    <p:sldId id="272" r:id="rId16"/>
+    <p:sldId id="273" r:id="rId17"/>
+    <p:sldId id="274" r:id="rId18"/>
+    <p:sldId id="275" r:id="rId19"/>
   </p:sldIdLst>
   <p:sldSz cx="12192000" cy="6858000"/>
   <p:notesSz cx="6858000" cy="9144000"/>
@@ -249,7 +260,7 @@
           <a:p>
             <a:fld id="{F52ED411-EA49-443C-9067-5D8A717A5C57}" type="datetimeFigureOut">
               <a:rPr lang="ko-KR" altLang="en-US" smtClean="0"/>
-              <a:t>2020-06-14</a:t>
+              <a:t>2020-06-22</a:t>
             </a:fld>
             <a:endParaRPr lang="ko-KR" altLang="en-US"/>
           </a:p>
@@ -419,7 +430,7 @@
           <a:p>
             <a:fld id="{F52ED411-EA49-443C-9067-5D8A717A5C57}" type="datetimeFigureOut">
               <a:rPr lang="ko-KR" altLang="en-US" smtClean="0"/>
-              <a:t>2020-06-14</a:t>
+              <a:t>2020-06-22</a:t>
             </a:fld>
             <a:endParaRPr lang="ko-KR" altLang="en-US"/>
           </a:p>
@@ -599,7 +610,7 @@
           <a:p>
             <a:fld id="{F52ED411-EA49-443C-9067-5D8A717A5C57}" type="datetimeFigureOut">
               <a:rPr lang="ko-KR" altLang="en-US" smtClean="0"/>
-              <a:t>2020-06-14</a:t>
+              <a:t>2020-06-22</a:t>
             </a:fld>
             <a:endParaRPr lang="ko-KR" altLang="en-US"/>
           </a:p>
@@ -769,7 +780,7 @@
           <a:p>
             <a:fld id="{F52ED411-EA49-443C-9067-5D8A717A5C57}" type="datetimeFigureOut">
               <a:rPr lang="ko-KR" altLang="en-US" smtClean="0"/>
-              <a:t>2020-06-14</a:t>
+              <a:t>2020-06-22</a:t>
             </a:fld>
             <a:endParaRPr lang="ko-KR" altLang="en-US"/>
           </a:p>
@@ -1015,7 +1026,7 @@
           <a:p>
             <a:fld id="{F52ED411-EA49-443C-9067-5D8A717A5C57}" type="datetimeFigureOut">
               <a:rPr lang="ko-KR" altLang="en-US" smtClean="0"/>
-              <a:t>2020-06-14</a:t>
+              <a:t>2020-06-22</a:t>
             </a:fld>
             <a:endParaRPr lang="ko-KR" altLang="en-US"/>
           </a:p>
@@ -1247,7 +1258,7 @@
           <a:p>
             <a:fld id="{F52ED411-EA49-443C-9067-5D8A717A5C57}" type="datetimeFigureOut">
               <a:rPr lang="ko-KR" altLang="en-US" smtClean="0"/>
-              <a:t>2020-06-14</a:t>
+              <a:t>2020-06-22</a:t>
             </a:fld>
             <a:endParaRPr lang="ko-KR" altLang="en-US"/>
           </a:p>
@@ -1614,7 +1625,7 @@
           <a:p>
             <a:fld id="{F52ED411-EA49-443C-9067-5D8A717A5C57}" type="datetimeFigureOut">
               <a:rPr lang="ko-KR" altLang="en-US" smtClean="0"/>
-              <a:t>2020-06-14</a:t>
+              <a:t>2020-06-22</a:t>
             </a:fld>
             <a:endParaRPr lang="ko-KR" altLang="en-US"/>
           </a:p>
@@ -1732,7 +1743,7 @@
           <a:p>
             <a:fld id="{F52ED411-EA49-443C-9067-5D8A717A5C57}" type="datetimeFigureOut">
               <a:rPr lang="ko-KR" altLang="en-US" smtClean="0"/>
-              <a:t>2020-06-14</a:t>
+              <a:t>2020-06-22</a:t>
             </a:fld>
             <a:endParaRPr lang="ko-KR" altLang="en-US"/>
           </a:p>
@@ -1827,7 +1838,7 @@
           <a:p>
             <a:fld id="{F52ED411-EA49-443C-9067-5D8A717A5C57}" type="datetimeFigureOut">
               <a:rPr lang="ko-KR" altLang="en-US" smtClean="0"/>
-              <a:t>2020-06-14</a:t>
+              <a:t>2020-06-22</a:t>
             </a:fld>
             <a:endParaRPr lang="ko-KR" altLang="en-US"/>
           </a:p>
@@ -2104,7 +2115,7 @@
           <a:p>
             <a:fld id="{F52ED411-EA49-443C-9067-5D8A717A5C57}" type="datetimeFigureOut">
               <a:rPr lang="ko-KR" altLang="en-US" smtClean="0"/>
-              <a:t>2020-06-14</a:t>
+              <a:t>2020-06-22</a:t>
             </a:fld>
             <a:endParaRPr lang="ko-KR" altLang="en-US"/>
           </a:p>
@@ -2357,7 +2368,7 @@
           <a:p>
             <a:fld id="{F52ED411-EA49-443C-9067-5D8A717A5C57}" type="datetimeFigureOut">
               <a:rPr lang="ko-KR" altLang="en-US" smtClean="0"/>
-              <a:t>2020-06-14</a:t>
+              <a:t>2020-06-22</a:t>
             </a:fld>
             <a:endParaRPr lang="ko-KR" altLang="en-US"/>
           </a:p>
@@ -2573,7 +2584,7 @@
             <a:fld id="{F52ED411-EA49-443C-9067-5D8A717A5C57}" type="datetimeFigureOut">
               <a:rPr lang="ko-KR" altLang="en-US" smtClean="0"/>
               <a:pPr/>
-              <a:t>2020-06-14</a:t>
+              <a:t>2020-06-22</a:t>
             </a:fld>
             <a:endParaRPr lang="ko-KR" altLang="en-US" dirty="0"/>
           </a:p>
@@ -3062,6 +3073,2555 @@
 </p:sld>
 </file>
 
+<file path=ppt/slides/slide10.xml><?xml version="1.0" encoding="utf-8"?>
+<p:sld xmlns:a="http://schemas.openxmlformats.org/drawingml/2006/main" xmlns:r="http://schemas.openxmlformats.org/officeDocument/2006/relationships" xmlns:p="http://schemas.openxmlformats.org/presentationml/2006/main">
+  <p:cSld>
+    <p:spTree>
+      <p:nvGrpSpPr>
+        <p:cNvPr id="1" name=""/>
+        <p:cNvGrpSpPr/>
+        <p:nvPr/>
+      </p:nvGrpSpPr>
+      <p:grpSpPr>
+        <a:xfrm>
+          <a:off x="0" y="0"/>
+          <a:ext cx="0" cy="0"/>
+          <a:chOff x="0" y="0"/>
+          <a:chExt cx="0" cy="0"/>
+        </a:xfrm>
+      </p:grpSpPr>
+      <p:sp>
+        <p:nvSpPr>
+          <p:cNvPr id="2" name="TextBox 1"/>
+          <p:cNvSpPr txBox="1"/>
+          <p:nvPr/>
+        </p:nvSpPr>
+        <p:spPr>
+          <a:xfrm>
+            <a:off x="336884" y="320842"/>
+            <a:ext cx="2085827" cy="461665"/>
+          </a:xfrm>
+          <a:prstGeom prst="rect">
+            <a:avLst/>
+          </a:prstGeom>
+          <a:noFill/>
+        </p:spPr>
+        <p:txBody>
+          <a:bodyPr wrap="none" rtlCol="0">
+            <a:spAutoFit/>
+          </a:bodyPr>
+          <a:lstStyle/>
+          <a:p>
+            <a:r>
+              <a:rPr lang="ko-KR" altLang="en-US" sz="2400" dirty="0" smtClean="0">
+                <a:solidFill>
+                  <a:srgbClr val="A4C639"/>
+                </a:solidFill>
+                <a:latin typeface="배달의민족 도현" panose="020B0600000101010101" pitchFamily="50" charset="-127"/>
+                <a:ea typeface="배달의민족 도현" panose="020B0600000101010101" pitchFamily="50" charset="-127"/>
+              </a:rPr>
+              <a:t>클래스 </a:t>
+            </a:r>
+            <a:r>
+              <a:rPr lang="en-US" altLang="ko-KR" sz="2400" dirty="0" smtClean="0">
+                <a:solidFill>
+                  <a:srgbClr val="A4C639"/>
+                </a:solidFill>
+                <a:latin typeface="배달의민족 도현" panose="020B0600000101010101" pitchFamily="50" charset="-127"/>
+                <a:ea typeface="배달의민족 도현" panose="020B0600000101010101" pitchFamily="50" charset="-127"/>
+              </a:rPr>
+              <a:t>&amp; </a:t>
+            </a:r>
+            <a:r>
+              <a:rPr lang="ko-KR" altLang="en-US" sz="2400" dirty="0" smtClean="0">
+                <a:solidFill>
+                  <a:srgbClr val="A4C639"/>
+                </a:solidFill>
+                <a:latin typeface="배달의민족 도현" panose="020B0600000101010101" pitchFamily="50" charset="-127"/>
+                <a:ea typeface="배달의민족 도현" panose="020B0600000101010101" pitchFamily="50" charset="-127"/>
+              </a:rPr>
+              <a:t>객체</a:t>
+            </a:r>
+            <a:endParaRPr lang="ko-KR" altLang="en-US" sz="2400" dirty="0">
+              <a:solidFill>
+                <a:srgbClr val="A4C639"/>
+              </a:solidFill>
+              <a:latin typeface="배달의민족 도현" panose="020B0600000101010101" pitchFamily="50" charset="-127"/>
+              <a:ea typeface="배달의민족 도현" panose="020B0600000101010101" pitchFamily="50" charset="-127"/>
+            </a:endParaRPr>
+          </a:p>
+        </p:txBody>
+      </p:sp>
+      <p:pic>
+        <p:nvPicPr>
+          <p:cNvPr id="9" name="그림 8"/>
+          <p:cNvPicPr>
+            <a:picLocks noChangeAspect="1"/>
+          </p:cNvPicPr>
+          <p:nvPr/>
+        </p:nvPicPr>
+        <p:blipFill>
+          <a:blip r:embed="rId2"/>
+          <a:stretch>
+            <a:fillRect/>
+          </a:stretch>
+        </p:blipFill>
+        <p:spPr>
+          <a:xfrm>
+            <a:off x="814178" y="2220277"/>
+            <a:ext cx="7189248" cy="3149745"/>
+          </a:xfrm>
+          <a:prstGeom prst="rect">
+            <a:avLst/>
+          </a:prstGeom>
+        </p:spPr>
+      </p:pic>
+      <p:sp>
+        <p:nvSpPr>
+          <p:cNvPr id="10" name="오른쪽 화살표 9"/>
+          <p:cNvSpPr/>
+          <p:nvPr/>
+        </p:nvSpPr>
+        <p:spPr>
+          <a:xfrm>
+            <a:off x="4854634" y="2676698"/>
+            <a:ext cx="3973482" cy="548640"/>
+          </a:xfrm>
+          <a:prstGeom prst="rightArrow">
+            <a:avLst>
+              <a:gd name="adj1" fmla="val 31818"/>
+              <a:gd name="adj2" fmla="val 50000"/>
+            </a:avLst>
+          </a:prstGeom>
+          <a:solidFill>
+            <a:srgbClr val="FF0000"/>
+          </a:solidFill>
+          <a:ln>
+            <a:solidFill>
+              <a:srgbClr val="FF0000"/>
+            </a:solidFill>
+          </a:ln>
+        </p:spPr>
+        <p:style>
+          <a:lnRef idx="2">
+            <a:schemeClr val="accent1">
+              <a:shade val="50000"/>
+            </a:schemeClr>
+          </a:lnRef>
+          <a:fillRef idx="1">
+            <a:schemeClr val="accent1"/>
+          </a:fillRef>
+          <a:effectRef idx="0">
+            <a:schemeClr val="accent1"/>
+          </a:effectRef>
+          <a:fontRef idx="minor">
+            <a:schemeClr val="lt1"/>
+          </a:fontRef>
+        </p:style>
+        <p:txBody>
+          <a:bodyPr rtlCol="0" anchor="ctr"/>
+          <a:lstStyle/>
+          <a:p>
+            <a:pPr algn="ctr"/>
+            <a:endParaRPr lang="ko-KR" altLang="en-US" dirty="0">
+              <a:latin typeface="배달의민족 도현" panose="020B0600000101010101" pitchFamily="50" charset="-127"/>
+              <a:ea typeface="배달의민족 도현" panose="020B0600000101010101" pitchFamily="50" charset="-127"/>
+            </a:endParaRPr>
+          </a:p>
+        </p:txBody>
+      </p:sp>
+      <p:sp>
+        <p:nvSpPr>
+          <p:cNvPr id="11" name="오른쪽 화살표 10"/>
+          <p:cNvSpPr/>
+          <p:nvPr/>
+        </p:nvSpPr>
+        <p:spPr>
+          <a:xfrm>
+            <a:off x="5821680" y="4023360"/>
+            <a:ext cx="3006436" cy="548640"/>
+          </a:xfrm>
+          <a:prstGeom prst="rightArrow">
+            <a:avLst>
+              <a:gd name="adj1" fmla="val 31818"/>
+              <a:gd name="adj2" fmla="val 50000"/>
+            </a:avLst>
+          </a:prstGeom>
+          <a:solidFill>
+            <a:srgbClr val="0070C0"/>
+          </a:solidFill>
+          <a:ln>
+            <a:solidFill>
+              <a:srgbClr val="0070C0"/>
+            </a:solidFill>
+          </a:ln>
+        </p:spPr>
+        <p:style>
+          <a:lnRef idx="2">
+            <a:schemeClr val="accent1">
+              <a:shade val="50000"/>
+            </a:schemeClr>
+          </a:lnRef>
+          <a:fillRef idx="1">
+            <a:schemeClr val="accent1"/>
+          </a:fillRef>
+          <a:effectRef idx="0">
+            <a:schemeClr val="accent1"/>
+          </a:effectRef>
+          <a:fontRef idx="minor">
+            <a:schemeClr val="lt1"/>
+          </a:fontRef>
+        </p:style>
+        <p:txBody>
+          <a:bodyPr rtlCol="0" anchor="ctr"/>
+          <a:lstStyle/>
+          <a:p>
+            <a:pPr algn="ctr"/>
+            <a:endParaRPr lang="ko-KR" altLang="en-US" dirty="0">
+              <a:latin typeface="배달의민족 도현" panose="020B0600000101010101" pitchFamily="50" charset="-127"/>
+              <a:ea typeface="배달의민족 도현" panose="020B0600000101010101" pitchFamily="50" charset="-127"/>
+            </a:endParaRPr>
+          </a:p>
+        </p:txBody>
+      </p:sp>
+      <p:sp>
+        <p:nvSpPr>
+          <p:cNvPr id="12" name="TextBox 11"/>
+          <p:cNvSpPr txBox="1"/>
+          <p:nvPr/>
+        </p:nvSpPr>
+        <p:spPr>
+          <a:xfrm>
+            <a:off x="9310254" y="2763673"/>
+            <a:ext cx="1107996" cy="461665"/>
+          </a:xfrm>
+          <a:prstGeom prst="rect">
+            <a:avLst/>
+          </a:prstGeom>
+          <a:noFill/>
+        </p:spPr>
+        <p:txBody>
+          <a:bodyPr wrap="none" rtlCol="0">
+            <a:spAutoFit/>
+          </a:bodyPr>
+          <a:lstStyle/>
+          <a:p>
+            <a:r>
+              <a:rPr lang="ko-KR" altLang="en-US" sz="2400" dirty="0" smtClean="0">
+                <a:latin typeface="배달의민족 도현" panose="020B0600000101010101" pitchFamily="50" charset="-127"/>
+                <a:ea typeface="배달의민족 도현" panose="020B0600000101010101" pitchFamily="50" charset="-127"/>
+              </a:rPr>
+              <a:t>클래스</a:t>
+            </a:r>
+            <a:endParaRPr lang="ko-KR" altLang="en-US" sz="2400" dirty="0">
+              <a:latin typeface="배달의민족 도현" panose="020B0600000101010101" pitchFamily="50" charset="-127"/>
+              <a:ea typeface="배달의민족 도현" panose="020B0600000101010101" pitchFamily="50" charset="-127"/>
+            </a:endParaRPr>
+          </a:p>
+        </p:txBody>
+      </p:sp>
+      <p:sp>
+        <p:nvSpPr>
+          <p:cNvPr id="13" name="TextBox 12"/>
+          <p:cNvSpPr txBox="1"/>
+          <p:nvPr/>
+        </p:nvSpPr>
+        <p:spPr>
+          <a:xfrm>
+            <a:off x="9310254" y="4110335"/>
+            <a:ext cx="800219" cy="461665"/>
+          </a:xfrm>
+          <a:prstGeom prst="rect">
+            <a:avLst/>
+          </a:prstGeom>
+          <a:noFill/>
+        </p:spPr>
+        <p:txBody>
+          <a:bodyPr wrap="none" rtlCol="0">
+            <a:spAutoFit/>
+          </a:bodyPr>
+          <a:lstStyle/>
+          <a:p>
+            <a:r>
+              <a:rPr lang="ko-KR" altLang="en-US" sz="2400" dirty="0" smtClean="0">
+                <a:latin typeface="배달의민족 도현" panose="020B0600000101010101" pitchFamily="50" charset="-127"/>
+                <a:ea typeface="배달의민족 도현" panose="020B0600000101010101" pitchFamily="50" charset="-127"/>
+              </a:rPr>
+              <a:t>객체</a:t>
+            </a:r>
+            <a:endParaRPr lang="ko-KR" altLang="en-US" sz="2400" dirty="0">
+              <a:latin typeface="배달의민족 도현" panose="020B0600000101010101" pitchFamily="50" charset="-127"/>
+              <a:ea typeface="배달의민족 도현" panose="020B0600000101010101" pitchFamily="50" charset="-127"/>
+            </a:endParaRPr>
+          </a:p>
+        </p:txBody>
+      </p:sp>
+      <p:sp>
+        <p:nvSpPr>
+          <p:cNvPr id="14" name="직사각형 13"/>
+          <p:cNvSpPr/>
+          <p:nvPr/>
+        </p:nvSpPr>
+        <p:spPr>
+          <a:xfrm>
+            <a:off x="897774" y="2460567"/>
+            <a:ext cx="3408218" cy="980902"/>
+          </a:xfrm>
+          <a:prstGeom prst="rect">
+            <a:avLst/>
+          </a:prstGeom>
+          <a:noFill/>
+          <a:ln w="57150">
+            <a:solidFill>
+              <a:srgbClr val="FF0000"/>
+            </a:solidFill>
+          </a:ln>
+        </p:spPr>
+        <p:style>
+          <a:lnRef idx="2">
+            <a:schemeClr val="accent1">
+              <a:shade val="50000"/>
+            </a:schemeClr>
+          </a:lnRef>
+          <a:fillRef idx="1">
+            <a:schemeClr val="accent1"/>
+          </a:fillRef>
+          <a:effectRef idx="0">
+            <a:schemeClr val="accent1"/>
+          </a:effectRef>
+          <a:fontRef idx="minor">
+            <a:schemeClr val="lt1"/>
+          </a:fontRef>
+        </p:style>
+        <p:txBody>
+          <a:bodyPr rtlCol="0" anchor="ctr"/>
+          <a:lstStyle/>
+          <a:p>
+            <a:pPr algn="ctr"/>
+            <a:endParaRPr lang="ko-KR" altLang="en-US" dirty="0">
+              <a:latin typeface="배달의민족 도현" panose="020B0600000101010101" pitchFamily="50" charset="-127"/>
+              <a:ea typeface="배달의민족 도현" panose="020B0600000101010101" pitchFamily="50" charset="-127"/>
+            </a:endParaRPr>
+          </a:p>
+        </p:txBody>
+      </p:sp>
+      <p:sp>
+        <p:nvSpPr>
+          <p:cNvPr id="15" name="직사각형 14"/>
+          <p:cNvSpPr/>
+          <p:nvPr/>
+        </p:nvSpPr>
+        <p:spPr>
+          <a:xfrm>
+            <a:off x="897774" y="3795149"/>
+            <a:ext cx="4380808" cy="980902"/>
+          </a:xfrm>
+          <a:prstGeom prst="rect">
+            <a:avLst/>
+          </a:prstGeom>
+          <a:noFill/>
+          <a:ln w="57150">
+            <a:solidFill>
+              <a:srgbClr val="0070C0"/>
+            </a:solidFill>
+          </a:ln>
+        </p:spPr>
+        <p:style>
+          <a:lnRef idx="2">
+            <a:schemeClr val="accent1">
+              <a:shade val="50000"/>
+            </a:schemeClr>
+          </a:lnRef>
+          <a:fillRef idx="1">
+            <a:schemeClr val="accent1"/>
+          </a:fillRef>
+          <a:effectRef idx="0">
+            <a:schemeClr val="accent1"/>
+          </a:effectRef>
+          <a:fontRef idx="minor">
+            <a:schemeClr val="lt1"/>
+          </a:fontRef>
+        </p:style>
+        <p:txBody>
+          <a:bodyPr rtlCol="0" anchor="ctr"/>
+          <a:lstStyle/>
+          <a:p>
+            <a:pPr algn="ctr"/>
+            <a:endParaRPr lang="ko-KR" altLang="en-US" dirty="0">
+              <a:latin typeface="배달의민족 도현" panose="020B0600000101010101" pitchFamily="50" charset="-127"/>
+              <a:ea typeface="배달의민족 도현" panose="020B0600000101010101" pitchFamily="50" charset="-127"/>
+            </a:endParaRPr>
+          </a:p>
+        </p:txBody>
+      </p:sp>
+    </p:spTree>
+    <p:extLst>
+      <p:ext uri="{BB962C8B-B14F-4D97-AF65-F5344CB8AC3E}">
+        <p14:creationId xmlns:p14="http://schemas.microsoft.com/office/powerpoint/2010/main" val="2223097218"/>
+      </p:ext>
+    </p:extLst>
+  </p:cSld>
+  <p:clrMapOvr>
+    <a:masterClrMapping/>
+  </p:clrMapOvr>
+  <p:timing>
+    <p:tnLst>
+      <p:par>
+        <p:cTn id="1" dur="indefinite" restart="never" nodeType="tmRoot"/>
+      </p:par>
+    </p:tnLst>
+  </p:timing>
+</p:sld>
+</file>
+
+<file path=ppt/slides/slide11.xml><?xml version="1.0" encoding="utf-8"?>
+<p:sld xmlns:a="http://schemas.openxmlformats.org/drawingml/2006/main" xmlns:r="http://schemas.openxmlformats.org/officeDocument/2006/relationships" xmlns:p="http://schemas.openxmlformats.org/presentationml/2006/main">
+  <p:cSld>
+    <p:spTree>
+      <p:nvGrpSpPr>
+        <p:cNvPr id="1" name=""/>
+        <p:cNvGrpSpPr/>
+        <p:nvPr/>
+      </p:nvGrpSpPr>
+      <p:grpSpPr>
+        <a:xfrm>
+          <a:off x="0" y="0"/>
+          <a:ext cx="0" cy="0"/>
+          <a:chOff x="0" y="0"/>
+          <a:chExt cx="0" cy="0"/>
+        </a:xfrm>
+      </p:grpSpPr>
+      <p:sp>
+        <p:nvSpPr>
+          <p:cNvPr id="2" name="TextBox 1"/>
+          <p:cNvSpPr txBox="1"/>
+          <p:nvPr/>
+        </p:nvSpPr>
+        <p:spPr>
+          <a:xfrm>
+            <a:off x="336884" y="320842"/>
+            <a:ext cx="1069524" cy="461665"/>
+          </a:xfrm>
+          <a:prstGeom prst="rect">
+            <a:avLst/>
+          </a:prstGeom>
+          <a:noFill/>
+        </p:spPr>
+        <p:txBody>
+          <a:bodyPr wrap="none" rtlCol="0">
+            <a:spAutoFit/>
+          </a:bodyPr>
+          <a:lstStyle/>
+          <a:p>
+            <a:r>
+              <a:rPr lang="ko-KR" altLang="en-US" sz="2400" dirty="0" err="1" smtClean="0">
+                <a:solidFill>
+                  <a:srgbClr val="A4C639"/>
+                </a:solidFill>
+                <a:latin typeface="배달의민족 도현" panose="020B0600000101010101" pitchFamily="50" charset="-127"/>
+                <a:ea typeface="배달의민족 도현" panose="020B0600000101010101" pitchFamily="50" charset="-127"/>
+              </a:rPr>
+              <a:t>메소드</a:t>
+            </a:r>
+            <a:endParaRPr lang="ko-KR" altLang="en-US" sz="2400" dirty="0">
+              <a:solidFill>
+                <a:srgbClr val="A4C639"/>
+              </a:solidFill>
+              <a:latin typeface="배달의민족 도현" panose="020B0600000101010101" pitchFamily="50" charset="-127"/>
+              <a:ea typeface="배달의민족 도현" panose="020B0600000101010101" pitchFamily="50" charset="-127"/>
+            </a:endParaRPr>
+          </a:p>
+        </p:txBody>
+      </p:sp>
+      <p:pic>
+        <p:nvPicPr>
+          <p:cNvPr id="8" name="그림 7"/>
+          <p:cNvPicPr>
+            <a:picLocks noChangeAspect="1"/>
+          </p:cNvPicPr>
+          <p:nvPr/>
+        </p:nvPicPr>
+        <p:blipFill>
+          <a:blip r:embed="rId2"/>
+          <a:stretch>
+            <a:fillRect/>
+          </a:stretch>
+        </p:blipFill>
+        <p:spPr>
+          <a:xfrm>
+            <a:off x="664549" y="1322501"/>
+            <a:ext cx="7734834" cy="4637724"/>
+          </a:xfrm>
+          <a:prstGeom prst="rect">
+            <a:avLst/>
+          </a:prstGeom>
+        </p:spPr>
+      </p:pic>
+      <p:sp>
+        <p:nvSpPr>
+          <p:cNvPr id="3" name="직사각형 2"/>
+          <p:cNvSpPr/>
+          <p:nvPr/>
+        </p:nvSpPr>
+        <p:spPr>
+          <a:xfrm>
+            <a:off x="1064029" y="1712422"/>
+            <a:ext cx="4804756" cy="1130531"/>
+          </a:xfrm>
+          <a:prstGeom prst="rect">
+            <a:avLst/>
+          </a:prstGeom>
+          <a:noFill/>
+          <a:ln w="28575">
+            <a:solidFill>
+              <a:srgbClr val="FF0000"/>
+            </a:solidFill>
+          </a:ln>
+        </p:spPr>
+        <p:style>
+          <a:lnRef idx="2">
+            <a:schemeClr val="accent1">
+              <a:shade val="50000"/>
+            </a:schemeClr>
+          </a:lnRef>
+          <a:fillRef idx="1">
+            <a:schemeClr val="accent1"/>
+          </a:fillRef>
+          <a:effectRef idx="0">
+            <a:schemeClr val="accent1"/>
+          </a:effectRef>
+          <a:fontRef idx="minor">
+            <a:schemeClr val="lt1"/>
+          </a:fontRef>
+        </p:style>
+        <p:txBody>
+          <a:bodyPr rtlCol="0" anchor="ctr"/>
+          <a:lstStyle/>
+          <a:p>
+            <a:pPr algn="ctr"/>
+            <a:endParaRPr lang="ko-KR" altLang="en-US" dirty="0">
+              <a:latin typeface="배달의민족 도현" panose="020B0600000101010101" pitchFamily="50" charset="-127"/>
+              <a:ea typeface="배달의민족 도현" panose="020B0600000101010101" pitchFamily="50" charset="-127"/>
+            </a:endParaRPr>
+          </a:p>
+        </p:txBody>
+      </p:sp>
+      <p:sp>
+        <p:nvSpPr>
+          <p:cNvPr id="5" name="오른쪽 화살표 4"/>
+          <p:cNvSpPr/>
+          <p:nvPr/>
+        </p:nvSpPr>
+        <p:spPr>
+          <a:xfrm>
+            <a:off x="6049107" y="2153134"/>
+            <a:ext cx="2749755" cy="548640"/>
+          </a:xfrm>
+          <a:prstGeom prst="rightArrow">
+            <a:avLst>
+              <a:gd name="adj1" fmla="val 31818"/>
+              <a:gd name="adj2" fmla="val 50000"/>
+            </a:avLst>
+          </a:prstGeom>
+          <a:solidFill>
+            <a:srgbClr val="FF0000"/>
+          </a:solidFill>
+          <a:ln>
+            <a:solidFill>
+              <a:srgbClr val="FF0000"/>
+            </a:solidFill>
+          </a:ln>
+        </p:spPr>
+        <p:style>
+          <a:lnRef idx="2">
+            <a:schemeClr val="accent1">
+              <a:shade val="50000"/>
+            </a:schemeClr>
+          </a:lnRef>
+          <a:fillRef idx="1">
+            <a:schemeClr val="accent1"/>
+          </a:fillRef>
+          <a:effectRef idx="0">
+            <a:schemeClr val="accent1"/>
+          </a:effectRef>
+          <a:fontRef idx="minor">
+            <a:schemeClr val="lt1"/>
+          </a:fontRef>
+        </p:style>
+        <p:txBody>
+          <a:bodyPr rtlCol="0" anchor="ctr"/>
+          <a:lstStyle/>
+          <a:p>
+            <a:pPr algn="ctr"/>
+            <a:endParaRPr lang="ko-KR" altLang="en-US" dirty="0">
+              <a:latin typeface="배달의민족 도현" panose="020B0600000101010101" pitchFamily="50" charset="-127"/>
+              <a:ea typeface="배달의민족 도현" panose="020B0600000101010101" pitchFamily="50" charset="-127"/>
+            </a:endParaRPr>
+          </a:p>
+        </p:txBody>
+      </p:sp>
+      <p:sp>
+        <p:nvSpPr>
+          <p:cNvPr id="7" name="TextBox 6"/>
+          <p:cNvSpPr txBox="1"/>
+          <p:nvPr/>
+        </p:nvSpPr>
+        <p:spPr>
+          <a:xfrm>
+            <a:off x="8789297" y="2011956"/>
+            <a:ext cx="3225563" cy="830997"/>
+          </a:xfrm>
+          <a:prstGeom prst="rect">
+            <a:avLst/>
+          </a:prstGeom>
+          <a:noFill/>
+        </p:spPr>
+        <p:txBody>
+          <a:bodyPr wrap="none" rtlCol="0">
+            <a:spAutoFit/>
+          </a:bodyPr>
+          <a:lstStyle/>
+          <a:p>
+            <a:pPr algn="ctr"/>
+            <a:r>
+              <a:rPr lang="ko-KR" altLang="en-US" sz="2400" dirty="0" err="1" smtClean="0">
+                <a:latin typeface="배달의민족 도현" panose="020B0600000101010101" pitchFamily="50" charset="-127"/>
+                <a:ea typeface="배달의민족 도현" panose="020B0600000101010101" pitchFamily="50" charset="-127"/>
+              </a:rPr>
+              <a:t>메소드</a:t>
+            </a:r>
+            <a:endParaRPr lang="en-US" altLang="ko-KR" sz="2400" dirty="0" smtClean="0">
+              <a:latin typeface="배달의민족 도현" panose="020B0600000101010101" pitchFamily="50" charset="-127"/>
+              <a:ea typeface="배달의민족 도현" panose="020B0600000101010101" pitchFamily="50" charset="-127"/>
+            </a:endParaRPr>
+          </a:p>
+          <a:p>
+            <a:pPr algn="ctr"/>
+            <a:r>
+              <a:rPr lang="en-US" altLang="ko-KR" sz="2400" dirty="0" smtClean="0">
+                <a:latin typeface="배달의민족 도현" panose="020B0600000101010101" pitchFamily="50" charset="-127"/>
+                <a:ea typeface="배달의민족 도현" panose="020B0600000101010101" pitchFamily="50" charset="-127"/>
+              </a:rPr>
+              <a:t>(</a:t>
+            </a:r>
+            <a:r>
+              <a:rPr lang="ko-KR" altLang="en-US" sz="2400" dirty="0" err="1" smtClean="0">
+                <a:latin typeface="배달의민족 도현" panose="020B0600000101010101" pitchFamily="50" charset="-127"/>
+                <a:ea typeface="배달의민족 도현" panose="020B0600000101010101" pitchFamily="50" charset="-127"/>
+              </a:rPr>
+              <a:t>클래스안에</a:t>
+            </a:r>
+            <a:r>
+              <a:rPr lang="ko-KR" altLang="en-US" sz="2400" dirty="0" smtClean="0">
+                <a:latin typeface="배달의민족 도현" panose="020B0600000101010101" pitchFamily="50" charset="-127"/>
+                <a:ea typeface="배달의민족 도현" panose="020B0600000101010101" pitchFamily="50" charset="-127"/>
+              </a:rPr>
+              <a:t> 있는 함수</a:t>
+            </a:r>
+            <a:r>
+              <a:rPr lang="en-US" altLang="ko-KR" sz="2400" dirty="0" smtClean="0">
+                <a:latin typeface="배달의민족 도현" panose="020B0600000101010101" pitchFamily="50" charset="-127"/>
+                <a:ea typeface="배달의민족 도현" panose="020B0600000101010101" pitchFamily="50" charset="-127"/>
+              </a:rPr>
+              <a:t>)</a:t>
+            </a:r>
+            <a:endParaRPr lang="ko-KR" altLang="en-US" sz="2400" dirty="0">
+              <a:latin typeface="배달의민족 도현" panose="020B0600000101010101" pitchFamily="50" charset="-127"/>
+              <a:ea typeface="배달의민족 도현" panose="020B0600000101010101" pitchFamily="50" charset="-127"/>
+            </a:endParaRPr>
+          </a:p>
+        </p:txBody>
+      </p:sp>
+      <p:sp>
+        <p:nvSpPr>
+          <p:cNvPr id="9" name="TextBox 8"/>
+          <p:cNvSpPr txBox="1"/>
+          <p:nvPr/>
+        </p:nvSpPr>
+        <p:spPr>
+          <a:xfrm>
+            <a:off x="8721170" y="4142525"/>
+            <a:ext cx="3262287" cy="1477328"/>
+          </a:xfrm>
+          <a:prstGeom prst="rect">
+            <a:avLst/>
+          </a:prstGeom>
+          <a:noFill/>
+        </p:spPr>
+        <p:txBody>
+          <a:bodyPr wrap="square" rtlCol="0">
+            <a:spAutoFit/>
+          </a:bodyPr>
+          <a:lstStyle/>
+          <a:p>
+            <a:r>
+              <a:rPr lang="en-US" altLang="ko-KR" dirty="0" smtClean="0">
+                <a:latin typeface="배달의민족 도현" panose="020B0600000101010101" pitchFamily="50" charset="-127"/>
+                <a:ea typeface="배달의민족 도현" panose="020B0600000101010101" pitchFamily="50" charset="-127"/>
+              </a:rPr>
+              <a:t>Public?</a:t>
+            </a:r>
+          </a:p>
+          <a:p>
+            <a:r>
+              <a:rPr lang="ko-KR" altLang="en-US" dirty="0" err="1" smtClean="0">
+                <a:latin typeface="배달의민족 도현" panose="020B0600000101010101" pitchFamily="50" charset="-127"/>
+                <a:ea typeface="배달의민족 도현" panose="020B0600000101010101" pitchFamily="50" charset="-127"/>
+              </a:rPr>
+              <a:t>메소드나</a:t>
+            </a:r>
+            <a:r>
+              <a:rPr lang="ko-KR" altLang="en-US" dirty="0" smtClean="0">
+                <a:latin typeface="배달의민족 도현" panose="020B0600000101010101" pitchFamily="50" charset="-127"/>
+                <a:ea typeface="배달의민족 도현" panose="020B0600000101010101" pitchFamily="50" charset="-127"/>
+              </a:rPr>
+              <a:t> 클래스 접근을 </a:t>
+            </a:r>
+            <a:endParaRPr lang="en-US" altLang="ko-KR" dirty="0" smtClean="0">
+              <a:latin typeface="배달의민족 도현" panose="020B0600000101010101" pitchFamily="50" charset="-127"/>
+              <a:ea typeface="배달의민족 도현" panose="020B0600000101010101" pitchFamily="50" charset="-127"/>
+            </a:endParaRPr>
+          </a:p>
+          <a:p>
+            <a:r>
+              <a:rPr lang="ko-KR" altLang="en-US" dirty="0" smtClean="0">
+                <a:latin typeface="배달의민족 도현" panose="020B0600000101010101" pitchFamily="50" charset="-127"/>
+                <a:ea typeface="배달의민족 도현" panose="020B0600000101010101" pitchFamily="50" charset="-127"/>
+              </a:rPr>
+              <a:t>제어하는 </a:t>
+            </a:r>
+            <a:r>
+              <a:rPr lang="ko-KR" altLang="en-US" dirty="0" err="1" smtClean="0">
+                <a:latin typeface="배달의민족 도현" panose="020B0600000101010101" pitchFamily="50" charset="-127"/>
+                <a:ea typeface="배달의민족 도현" panose="020B0600000101010101" pitchFamily="50" charset="-127"/>
+              </a:rPr>
+              <a:t>접근제어자</a:t>
+            </a:r>
+            <a:r>
+              <a:rPr lang="ko-KR" altLang="en-US" dirty="0" smtClean="0">
+                <a:latin typeface="배달의민족 도현" panose="020B0600000101010101" pitchFamily="50" charset="-127"/>
+                <a:ea typeface="배달의민족 도현" panose="020B0600000101010101" pitchFamily="50" charset="-127"/>
+              </a:rPr>
+              <a:t> 중 하나</a:t>
+            </a:r>
+            <a:endParaRPr lang="en-US" altLang="ko-KR" dirty="0" smtClean="0">
+              <a:latin typeface="배달의민족 도현" panose="020B0600000101010101" pitchFamily="50" charset="-127"/>
+              <a:ea typeface="배달의민족 도현" panose="020B0600000101010101" pitchFamily="50" charset="-127"/>
+            </a:endParaRPr>
+          </a:p>
+          <a:p>
+            <a:endParaRPr lang="en-US" altLang="ko-KR" dirty="0">
+              <a:latin typeface="배달의민족 도현" panose="020B0600000101010101" pitchFamily="50" charset="-127"/>
+              <a:ea typeface="배달의민족 도현" panose="020B0600000101010101" pitchFamily="50" charset="-127"/>
+            </a:endParaRPr>
+          </a:p>
+          <a:p>
+            <a:r>
+              <a:rPr lang="ko-KR" altLang="en-US" dirty="0" smtClean="0">
+                <a:latin typeface="배달의민족 도현" panose="020B0600000101010101" pitchFamily="50" charset="-127"/>
+                <a:ea typeface="배달의민족 도현" panose="020B0600000101010101" pitchFamily="50" charset="-127"/>
+              </a:rPr>
+              <a:t>지금은 몰라도 돼 </a:t>
+            </a:r>
+            <a:r>
+              <a:rPr lang="ko-KR" altLang="en-US" dirty="0" err="1" smtClean="0">
+                <a:latin typeface="배달의민족 도현" panose="020B0600000101010101" pitchFamily="50" charset="-127"/>
+                <a:ea typeface="배달의민족 도현" panose="020B0600000101010101" pitchFamily="50" charset="-127"/>
+              </a:rPr>
+              <a:t>ㅎㅎ</a:t>
+            </a:r>
+            <a:endParaRPr lang="en-US" altLang="ko-KR" dirty="0" smtClean="0">
+              <a:latin typeface="배달의민족 도현" panose="020B0600000101010101" pitchFamily="50" charset="-127"/>
+              <a:ea typeface="배달의민족 도현" panose="020B0600000101010101" pitchFamily="50" charset="-127"/>
+            </a:endParaRPr>
+          </a:p>
+        </p:txBody>
+      </p:sp>
+    </p:spTree>
+    <p:extLst>
+      <p:ext uri="{BB962C8B-B14F-4D97-AF65-F5344CB8AC3E}">
+        <p14:creationId xmlns:p14="http://schemas.microsoft.com/office/powerpoint/2010/main" val="2579842206"/>
+      </p:ext>
+    </p:extLst>
+  </p:cSld>
+  <p:clrMapOvr>
+    <a:masterClrMapping/>
+  </p:clrMapOvr>
+  <p:timing>
+    <p:tnLst>
+      <p:par>
+        <p:cTn id="1" dur="indefinite" restart="never" nodeType="tmRoot"/>
+      </p:par>
+    </p:tnLst>
+  </p:timing>
+</p:sld>
+</file>
+
+<file path=ppt/slides/slide12.xml><?xml version="1.0" encoding="utf-8"?>
+<p:sld xmlns:a="http://schemas.openxmlformats.org/drawingml/2006/main" xmlns:r="http://schemas.openxmlformats.org/officeDocument/2006/relationships" xmlns:p="http://schemas.openxmlformats.org/presentationml/2006/main">
+  <p:cSld>
+    <p:spTree>
+      <p:nvGrpSpPr>
+        <p:cNvPr id="1" name=""/>
+        <p:cNvGrpSpPr/>
+        <p:nvPr/>
+      </p:nvGrpSpPr>
+      <p:grpSpPr>
+        <a:xfrm>
+          <a:off x="0" y="0"/>
+          <a:ext cx="0" cy="0"/>
+          <a:chOff x="0" y="0"/>
+          <a:chExt cx="0" cy="0"/>
+        </a:xfrm>
+      </p:grpSpPr>
+      <p:sp>
+        <p:nvSpPr>
+          <p:cNvPr id="5" name="TextBox 4"/>
+          <p:cNvSpPr txBox="1"/>
+          <p:nvPr/>
+        </p:nvSpPr>
+        <p:spPr>
+          <a:xfrm>
+            <a:off x="4410120" y="3122231"/>
+            <a:ext cx="3034805" cy="461665"/>
+          </a:xfrm>
+          <a:prstGeom prst="rect">
+            <a:avLst/>
+          </a:prstGeom>
+          <a:noFill/>
+        </p:spPr>
+        <p:txBody>
+          <a:bodyPr wrap="none" rtlCol="0">
+            <a:spAutoFit/>
+          </a:bodyPr>
+          <a:lstStyle/>
+          <a:p>
+            <a:r>
+              <a:rPr lang="ko-KR" altLang="en-US" sz="2400" dirty="0" smtClean="0">
+                <a:solidFill>
+                  <a:srgbClr val="A4C639"/>
+                </a:solidFill>
+                <a:latin typeface="배달의민족 도현" panose="020B0600000101010101" pitchFamily="50" charset="-127"/>
+                <a:ea typeface="배달의민족 도현" panose="020B0600000101010101" pitchFamily="50" charset="-127"/>
+              </a:rPr>
+              <a:t>안드로이드 스튜디오</a:t>
+            </a:r>
+            <a:endParaRPr lang="ko-KR" altLang="en-US" sz="2400" dirty="0">
+              <a:solidFill>
+                <a:srgbClr val="A4C639"/>
+              </a:solidFill>
+              <a:latin typeface="배달의민족 도현" panose="020B0600000101010101" pitchFamily="50" charset="-127"/>
+              <a:ea typeface="배달의민족 도현" panose="020B0600000101010101" pitchFamily="50" charset="-127"/>
+            </a:endParaRPr>
+          </a:p>
+        </p:txBody>
+      </p:sp>
+    </p:spTree>
+    <p:extLst>
+      <p:ext uri="{BB962C8B-B14F-4D97-AF65-F5344CB8AC3E}">
+        <p14:creationId xmlns:p14="http://schemas.microsoft.com/office/powerpoint/2010/main" val="1098168486"/>
+      </p:ext>
+    </p:extLst>
+  </p:cSld>
+  <p:clrMapOvr>
+    <a:masterClrMapping/>
+  </p:clrMapOvr>
+  <p:timing>
+    <p:tnLst>
+      <p:par>
+        <p:cTn id="1" dur="indefinite" restart="never" nodeType="tmRoot"/>
+      </p:par>
+    </p:tnLst>
+  </p:timing>
+</p:sld>
+</file>
+
+<file path=ppt/slides/slide13.xml><?xml version="1.0" encoding="utf-8"?>
+<p:sld xmlns:a="http://schemas.openxmlformats.org/drawingml/2006/main" xmlns:r="http://schemas.openxmlformats.org/officeDocument/2006/relationships" xmlns:p="http://schemas.openxmlformats.org/presentationml/2006/main">
+  <p:cSld>
+    <p:spTree>
+      <p:nvGrpSpPr>
+        <p:cNvPr id="1" name=""/>
+        <p:cNvGrpSpPr/>
+        <p:nvPr/>
+      </p:nvGrpSpPr>
+      <p:grpSpPr>
+        <a:xfrm>
+          <a:off x="0" y="0"/>
+          <a:ext cx="0" cy="0"/>
+          <a:chOff x="0" y="0"/>
+          <a:chExt cx="0" cy="0"/>
+        </a:xfrm>
+      </p:grpSpPr>
+      <p:pic>
+        <p:nvPicPr>
+          <p:cNvPr id="7" name="그림 6"/>
+          <p:cNvPicPr>
+            <a:picLocks noChangeAspect="1"/>
+          </p:cNvPicPr>
+          <p:nvPr/>
+        </p:nvPicPr>
+        <p:blipFill>
+          <a:blip r:embed="rId2"/>
+          <a:stretch>
+            <a:fillRect/>
+          </a:stretch>
+        </p:blipFill>
+        <p:spPr>
+          <a:xfrm>
+            <a:off x="0" y="0"/>
+            <a:ext cx="12378267" cy="6962775"/>
+          </a:xfrm>
+          <a:prstGeom prst="rect">
+            <a:avLst/>
+          </a:prstGeom>
+        </p:spPr>
+      </p:pic>
+      <p:sp>
+        <p:nvSpPr>
+          <p:cNvPr id="4" name="직사각형 3"/>
+          <p:cNvSpPr/>
+          <p:nvPr/>
+        </p:nvSpPr>
+        <p:spPr>
+          <a:xfrm>
+            <a:off x="58189" y="374074"/>
+            <a:ext cx="1920240" cy="3549533"/>
+          </a:xfrm>
+          <a:prstGeom prst="rect">
+            <a:avLst/>
+          </a:prstGeom>
+          <a:noFill/>
+          <a:ln w="38100">
+            <a:solidFill>
+              <a:srgbClr val="FF0000"/>
+            </a:solidFill>
+          </a:ln>
+        </p:spPr>
+        <p:style>
+          <a:lnRef idx="2">
+            <a:schemeClr val="accent1">
+              <a:shade val="50000"/>
+            </a:schemeClr>
+          </a:lnRef>
+          <a:fillRef idx="1">
+            <a:schemeClr val="accent1"/>
+          </a:fillRef>
+          <a:effectRef idx="0">
+            <a:schemeClr val="accent1"/>
+          </a:effectRef>
+          <a:fontRef idx="minor">
+            <a:schemeClr val="lt1"/>
+          </a:fontRef>
+        </p:style>
+        <p:txBody>
+          <a:bodyPr rtlCol="0" anchor="ctr"/>
+          <a:lstStyle/>
+          <a:p>
+            <a:pPr algn="ctr"/>
+            <a:endParaRPr lang="ko-KR" altLang="en-US" dirty="0">
+              <a:latin typeface="배달의민족 도현" panose="020B0600000101010101" pitchFamily="50" charset="-127"/>
+              <a:ea typeface="배달의민족 도현" panose="020B0600000101010101" pitchFamily="50" charset="-127"/>
+            </a:endParaRPr>
+          </a:p>
+        </p:txBody>
+      </p:sp>
+    </p:spTree>
+    <p:extLst>
+      <p:ext uri="{BB962C8B-B14F-4D97-AF65-F5344CB8AC3E}">
+        <p14:creationId xmlns:p14="http://schemas.microsoft.com/office/powerpoint/2010/main" val="1005557496"/>
+      </p:ext>
+    </p:extLst>
+  </p:cSld>
+  <p:clrMapOvr>
+    <a:masterClrMapping/>
+  </p:clrMapOvr>
+  <p:timing>
+    <p:tnLst>
+      <p:par>
+        <p:cTn id="1" dur="indefinite" restart="never" nodeType="tmRoot"/>
+      </p:par>
+    </p:tnLst>
+  </p:timing>
+</p:sld>
+</file>
+
+<file path=ppt/slides/slide14.xml><?xml version="1.0" encoding="utf-8"?>
+<p:sld xmlns:a="http://schemas.openxmlformats.org/drawingml/2006/main" xmlns:r="http://schemas.openxmlformats.org/officeDocument/2006/relationships" xmlns:p="http://schemas.openxmlformats.org/presentationml/2006/main">
+  <p:cSld>
+    <p:spTree>
+      <p:nvGrpSpPr>
+        <p:cNvPr id="1" name=""/>
+        <p:cNvGrpSpPr/>
+        <p:nvPr/>
+      </p:nvGrpSpPr>
+      <p:grpSpPr>
+        <a:xfrm>
+          <a:off x="0" y="0"/>
+          <a:ext cx="0" cy="0"/>
+          <a:chOff x="0" y="0"/>
+          <a:chExt cx="0" cy="0"/>
+        </a:xfrm>
+      </p:grpSpPr>
+      <p:sp>
+        <p:nvSpPr>
+          <p:cNvPr id="6" name="TextBox 5"/>
+          <p:cNvSpPr txBox="1"/>
+          <p:nvPr/>
+        </p:nvSpPr>
+        <p:spPr>
+          <a:xfrm>
+            <a:off x="4314304" y="1246909"/>
+            <a:ext cx="3076483" cy="338554"/>
+          </a:xfrm>
+          <a:prstGeom prst="rect">
+            <a:avLst/>
+          </a:prstGeom>
+          <a:noFill/>
+        </p:spPr>
+        <p:txBody>
+          <a:bodyPr wrap="none" rtlCol="0">
+            <a:spAutoFit/>
+          </a:bodyPr>
+          <a:lstStyle/>
+          <a:p>
+            <a:r>
+              <a:rPr lang="ko-KR" altLang="en-US" sz="1600" dirty="0" smtClean="0">
+                <a:latin typeface="배달의민족 도현" panose="020B0600000101010101" pitchFamily="50" charset="-127"/>
+                <a:ea typeface="배달의민족 도현" panose="020B0600000101010101" pitchFamily="50" charset="-127"/>
+              </a:rPr>
+              <a:t>권한 설정 및 자바 </a:t>
+            </a:r>
+            <a:r>
+              <a:rPr lang="ko-KR" altLang="en-US" sz="1600" dirty="0" err="1" smtClean="0">
+                <a:latin typeface="배달의민족 도현" panose="020B0600000101010101" pitchFamily="50" charset="-127"/>
+                <a:ea typeface="배달의민족 도현" panose="020B0600000101010101" pitchFamily="50" charset="-127"/>
+              </a:rPr>
+              <a:t>패키지명</a:t>
+            </a:r>
+            <a:r>
+              <a:rPr lang="ko-KR" altLang="en-US" sz="1600" dirty="0" smtClean="0">
+                <a:latin typeface="배달의민족 도현" panose="020B0600000101010101" pitchFamily="50" charset="-127"/>
+                <a:ea typeface="배달의민족 도현" panose="020B0600000101010101" pitchFamily="50" charset="-127"/>
+              </a:rPr>
+              <a:t> 정의</a:t>
+            </a:r>
+            <a:endParaRPr lang="ko-KR" altLang="en-US" sz="1600" dirty="0">
+              <a:latin typeface="배달의민족 도현" panose="020B0600000101010101" pitchFamily="50" charset="-127"/>
+              <a:ea typeface="배달의민족 도현" panose="020B0600000101010101" pitchFamily="50" charset="-127"/>
+            </a:endParaRPr>
+          </a:p>
+        </p:txBody>
+      </p:sp>
+      <p:pic>
+        <p:nvPicPr>
+          <p:cNvPr id="8" name="그림 7"/>
+          <p:cNvPicPr>
+            <a:picLocks noChangeAspect="1"/>
+          </p:cNvPicPr>
+          <p:nvPr/>
+        </p:nvPicPr>
+        <p:blipFill rotWithShape="1">
+          <a:blip r:embed="rId2"/>
+          <a:srcRect l="873" t="5133" r="82069" b="47590"/>
+          <a:stretch/>
+        </p:blipFill>
+        <p:spPr>
+          <a:xfrm>
+            <a:off x="432260" y="640078"/>
+            <a:ext cx="3549536" cy="5533919"/>
+          </a:xfrm>
+          <a:prstGeom prst="rect">
+            <a:avLst/>
+          </a:prstGeom>
+        </p:spPr>
+      </p:pic>
+      <p:sp>
+        <p:nvSpPr>
+          <p:cNvPr id="9" name="직사각형 8"/>
+          <p:cNvSpPr/>
+          <p:nvPr/>
+        </p:nvSpPr>
+        <p:spPr>
+          <a:xfrm>
+            <a:off x="864524" y="3266902"/>
+            <a:ext cx="906087" cy="257694"/>
+          </a:xfrm>
+          <a:prstGeom prst="rect">
+            <a:avLst/>
+          </a:prstGeom>
+          <a:noFill/>
+          <a:ln w="28575">
+            <a:solidFill>
+              <a:srgbClr val="FF0000"/>
+            </a:solidFill>
+          </a:ln>
+        </p:spPr>
+        <p:style>
+          <a:lnRef idx="2">
+            <a:schemeClr val="accent1">
+              <a:shade val="50000"/>
+            </a:schemeClr>
+          </a:lnRef>
+          <a:fillRef idx="1">
+            <a:schemeClr val="accent1"/>
+          </a:fillRef>
+          <a:effectRef idx="0">
+            <a:schemeClr val="accent1"/>
+          </a:effectRef>
+          <a:fontRef idx="minor">
+            <a:schemeClr val="lt1"/>
+          </a:fontRef>
+        </p:style>
+        <p:txBody>
+          <a:bodyPr rtlCol="0" anchor="ctr"/>
+          <a:lstStyle/>
+          <a:p>
+            <a:pPr algn="ctr"/>
+            <a:endParaRPr lang="ko-KR" altLang="en-US" dirty="0">
+              <a:latin typeface="배달의민족 도현" panose="020B0600000101010101" pitchFamily="50" charset="-127"/>
+              <a:ea typeface="배달의민족 도현" panose="020B0600000101010101" pitchFamily="50" charset="-127"/>
+            </a:endParaRPr>
+          </a:p>
+        </p:txBody>
+      </p:sp>
+      <p:sp>
+        <p:nvSpPr>
+          <p:cNvPr id="10" name="직사각형 9"/>
+          <p:cNvSpPr/>
+          <p:nvPr/>
+        </p:nvSpPr>
+        <p:spPr>
+          <a:xfrm>
+            <a:off x="864524" y="4164676"/>
+            <a:ext cx="1903614" cy="473826"/>
+          </a:xfrm>
+          <a:prstGeom prst="rect">
+            <a:avLst/>
+          </a:prstGeom>
+          <a:noFill/>
+          <a:ln w="28575">
+            <a:solidFill>
+              <a:srgbClr val="FFFF00"/>
+            </a:solidFill>
+          </a:ln>
+        </p:spPr>
+        <p:style>
+          <a:lnRef idx="2">
+            <a:schemeClr val="accent1">
+              <a:shade val="50000"/>
+            </a:schemeClr>
+          </a:lnRef>
+          <a:fillRef idx="1">
+            <a:schemeClr val="accent1"/>
+          </a:fillRef>
+          <a:effectRef idx="0">
+            <a:schemeClr val="accent1"/>
+          </a:effectRef>
+          <a:fontRef idx="minor">
+            <a:schemeClr val="lt1"/>
+          </a:fontRef>
+        </p:style>
+        <p:txBody>
+          <a:bodyPr rtlCol="0" anchor="ctr"/>
+          <a:lstStyle/>
+          <a:p>
+            <a:pPr algn="ctr"/>
+            <a:endParaRPr lang="ko-KR" altLang="en-US" dirty="0">
+              <a:latin typeface="배달의민족 도현" panose="020B0600000101010101" pitchFamily="50" charset="-127"/>
+              <a:ea typeface="배달의민족 도현" panose="020B0600000101010101" pitchFamily="50" charset="-127"/>
+            </a:endParaRPr>
+          </a:p>
+        </p:txBody>
+      </p:sp>
+      <p:sp>
+        <p:nvSpPr>
+          <p:cNvPr id="11" name="TextBox 10"/>
+          <p:cNvSpPr txBox="1"/>
+          <p:nvPr/>
+        </p:nvSpPr>
+        <p:spPr>
+          <a:xfrm>
+            <a:off x="4414060" y="3224157"/>
+            <a:ext cx="2640466" cy="338554"/>
+          </a:xfrm>
+          <a:prstGeom prst="rect">
+            <a:avLst/>
+          </a:prstGeom>
+          <a:noFill/>
+        </p:spPr>
+        <p:txBody>
+          <a:bodyPr wrap="none" rtlCol="0">
+            <a:spAutoFit/>
+          </a:bodyPr>
+          <a:lstStyle/>
+          <a:p>
+            <a:r>
+              <a:rPr lang="en-US" altLang="ko-KR" sz="1600" dirty="0" smtClean="0">
+                <a:latin typeface="배달의민족 도현" panose="020B0600000101010101" pitchFamily="50" charset="-127"/>
+                <a:ea typeface="배달의민족 도현" panose="020B0600000101010101" pitchFamily="50" charset="-127"/>
+              </a:rPr>
+              <a:t>Xml </a:t>
+            </a:r>
+            <a:r>
+              <a:rPr lang="ko-KR" altLang="en-US" sz="1600" dirty="0" smtClean="0">
+                <a:latin typeface="배달의민족 도현" panose="020B0600000101010101" pitchFamily="50" charset="-127"/>
+                <a:ea typeface="배달의민족 도현" panose="020B0600000101010101" pitchFamily="50" charset="-127"/>
+              </a:rPr>
+              <a:t>파일이 모여있는 폴더</a:t>
+            </a:r>
+            <a:endParaRPr lang="ko-KR" altLang="en-US" sz="1600" dirty="0">
+              <a:latin typeface="배달의민족 도현" panose="020B0600000101010101" pitchFamily="50" charset="-127"/>
+              <a:ea typeface="배달의민족 도현" panose="020B0600000101010101" pitchFamily="50" charset="-127"/>
+            </a:endParaRPr>
+          </a:p>
+        </p:txBody>
+      </p:sp>
+      <p:sp>
+        <p:nvSpPr>
+          <p:cNvPr id="12" name="직사각형 11"/>
+          <p:cNvSpPr/>
+          <p:nvPr/>
+        </p:nvSpPr>
+        <p:spPr>
+          <a:xfrm>
+            <a:off x="922713" y="1404851"/>
+            <a:ext cx="1845425" cy="324196"/>
+          </a:xfrm>
+          <a:prstGeom prst="rect">
+            <a:avLst/>
+          </a:prstGeom>
+          <a:noFill/>
+          <a:ln w="28575">
+            <a:solidFill>
+              <a:srgbClr val="92D050"/>
+            </a:solidFill>
+          </a:ln>
+        </p:spPr>
+        <p:style>
+          <a:lnRef idx="2">
+            <a:schemeClr val="accent1">
+              <a:shade val="50000"/>
+            </a:schemeClr>
+          </a:lnRef>
+          <a:fillRef idx="1">
+            <a:schemeClr val="accent1"/>
+          </a:fillRef>
+          <a:effectRef idx="0">
+            <a:schemeClr val="accent1"/>
+          </a:effectRef>
+          <a:fontRef idx="minor">
+            <a:schemeClr val="lt1"/>
+          </a:fontRef>
+        </p:style>
+        <p:txBody>
+          <a:bodyPr rtlCol="0" anchor="ctr"/>
+          <a:lstStyle/>
+          <a:p>
+            <a:pPr algn="ctr"/>
+            <a:endParaRPr lang="ko-KR" altLang="en-US" dirty="0">
+              <a:latin typeface="배달의민족 도현" panose="020B0600000101010101" pitchFamily="50" charset="-127"/>
+              <a:ea typeface="배달의민족 도현" panose="020B0600000101010101" pitchFamily="50" charset="-127"/>
+            </a:endParaRPr>
+          </a:p>
+        </p:txBody>
+      </p:sp>
+      <p:sp>
+        <p:nvSpPr>
+          <p:cNvPr id="13" name="TextBox 12"/>
+          <p:cNvSpPr txBox="1"/>
+          <p:nvPr/>
+        </p:nvSpPr>
+        <p:spPr>
+          <a:xfrm>
+            <a:off x="4414060" y="4164676"/>
+            <a:ext cx="3978974" cy="338554"/>
+          </a:xfrm>
+          <a:prstGeom prst="rect">
+            <a:avLst/>
+          </a:prstGeom>
+          <a:noFill/>
+        </p:spPr>
+        <p:txBody>
+          <a:bodyPr wrap="none" rtlCol="0">
+            <a:spAutoFit/>
+          </a:bodyPr>
+          <a:lstStyle/>
+          <a:p>
+            <a:r>
+              <a:rPr lang="ko-KR" altLang="en-US" sz="1600" dirty="0" smtClean="0">
+                <a:latin typeface="배달의민족 도현" panose="020B0600000101010101" pitchFamily="50" charset="-127"/>
+                <a:ea typeface="배달의민족 도현" panose="020B0600000101010101" pitchFamily="50" charset="-127"/>
+              </a:rPr>
+              <a:t>패키지 버전 설정</a:t>
+            </a:r>
+            <a:r>
+              <a:rPr lang="en-US" altLang="ko-KR" sz="1600" dirty="0" smtClean="0">
+                <a:latin typeface="배달의민족 도현" panose="020B0600000101010101" pitchFamily="50" charset="-127"/>
+                <a:ea typeface="배달의민족 도현" panose="020B0600000101010101" pitchFamily="50" charset="-127"/>
+              </a:rPr>
+              <a:t>, </a:t>
+            </a:r>
+            <a:r>
+              <a:rPr lang="ko-KR" altLang="en-US" sz="1600" dirty="0" smtClean="0">
+                <a:latin typeface="배달의민족 도현" panose="020B0600000101010101" pitchFamily="50" charset="-127"/>
+                <a:ea typeface="배달의민족 도현" panose="020B0600000101010101" pitchFamily="50" charset="-127"/>
+              </a:rPr>
+              <a:t>최상위 파일 설정 재정의</a:t>
+            </a:r>
+            <a:endParaRPr lang="ko-KR" altLang="en-US" sz="1600" dirty="0">
+              <a:latin typeface="배달의민족 도현" panose="020B0600000101010101" pitchFamily="50" charset="-127"/>
+              <a:ea typeface="배달의민족 도현" panose="020B0600000101010101" pitchFamily="50" charset="-127"/>
+            </a:endParaRPr>
+          </a:p>
+        </p:txBody>
+      </p:sp>
+    </p:spTree>
+    <p:extLst>
+      <p:ext uri="{BB962C8B-B14F-4D97-AF65-F5344CB8AC3E}">
+        <p14:creationId xmlns:p14="http://schemas.microsoft.com/office/powerpoint/2010/main" val="1006701592"/>
+      </p:ext>
+    </p:extLst>
+  </p:cSld>
+  <p:clrMapOvr>
+    <a:masterClrMapping/>
+  </p:clrMapOvr>
+  <p:timing>
+    <p:tnLst>
+      <p:par>
+        <p:cTn id="1" dur="indefinite" restart="never" nodeType="tmRoot"/>
+      </p:par>
+    </p:tnLst>
+  </p:timing>
+</p:sld>
+</file>
+
+<file path=ppt/slides/slide15.xml><?xml version="1.0" encoding="utf-8"?>
+<p:sld xmlns:a="http://schemas.openxmlformats.org/drawingml/2006/main" xmlns:r="http://schemas.openxmlformats.org/officeDocument/2006/relationships" xmlns:p="http://schemas.openxmlformats.org/presentationml/2006/main">
+  <p:cSld>
+    <p:spTree>
+      <p:nvGrpSpPr>
+        <p:cNvPr id="1" name=""/>
+        <p:cNvGrpSpPr/>
+        <p:nvPr/>
+      </p:nvGrpSpPr>
+      <p:grpSpPr>
+        <a:xfrm>
+          <a:off x="0" y="0"/>
+          <a:ext cx="0" cy="0"/>
+          <a:chOff x="0" y="0"/>
+          <a:chExt cx="0" cy="0"/>
+        </a:xfrm>
+      </p:grpSpPr>
+      <p:pic>
+        <p:nvPicPr>
+          <p:cNvPr id="7" name="그림 6"/>
+          <p:cNvPicPr>
+            <a:picLocks noChangeAspect="1"/>
+          </p:cNvPicPr>
+          <p:nvPr/>
+        </p:nvPicPr>
+        <p:blipFill>
+          <a:blip r:embed="rId2"/>
+          <a:stretch>
+            <a:fillRect/>
+          </a:stretch>
+        </p:blipFill>
+        <p:spPr>
+          <a:xfrm>
+            <a:off x="0" y="0"/>
+            <a:ext cx="12378267" cy="6962775"/>
+          </a:xfrm>
+          <a:prstGeom prst="rect">
+            <a:avLst/>
+          </a:prstGeom>
+        </p:spPr>
+      </p:pic>
+      <p:sp>
+        <p:nvSpPr>
+          <p:cNvPr id="8" name="직사각형 7"/>
+          <p:cNvSpPr/>
+          <p:nvPr/>
+        </p:nvSpPr>
+        <p:spPr>
+          <a:xfrm>
+            <a:off x="3117273" y="307572"/>
+            <a:ext cx="1047404" cy="332508"/>
+          </a:xfrm>
+          <a:prstGeom prst="rect">
+            <a:avLst/>
+          </a:prstGeom>
+          <a:noFill/>
+          <a:ln w="28575">
+            <a:solidFill>
+              <a:srgbClr val="FFFF00"/>
+            </a:solidFill>
+          </a:ln>
+        </p:spPr>
+        <p:style>
+          <a:lnRef idx="2">
+            <a:schemeClr val="accent1">
+              <a:shade val="50000"/>
+            </a:schemeClr>
+          </a:lnRef>
+          <a:fillRef idx="1">
+            <a:schemeClr val="accent1"/>
+          </a:fillRef>
+          <a:effectRef idx="0">
+            <a:schemeClr val="accent1"/>
+          </a:effectRef>
+          <a:fontRef idx="minor">
+            <a:schemeClr val="lt1"/>
+          </a:fontRef>
+        </p:style>
+        <p:txBody>
+          <a:bodyPr rtlCol="0" anchor="ctr"/>
+          <a:lstStyle/>
+          <a:p>
+            <a:pPr algn="ctr"/>
+            <a:endParaRPr lang="ko-KR" altLang="en-US" dirty="0">
+              <a:latin typeface="배달의민족 도현" panose="020B0600000101010101" pitchFamily="50" charset="-127"/>
+              <a:ea typeface="배달의민족 도현" panose="020B0600000101010101" pitchFamily="50" charset="-127"/>
+            </a:endParaRPr>
+          </a:p>
+        </p:txBody>
+      </p:sp>
+      <p:sp>
+        <p:nvSpPr>
+          <p:cNvPr id="5" name="자유형 4"/>
+          <p:cNvSpPr/>
+          <p:nvPr/>
+        </p:nvSpPr>
+        <p:spPr>
+          <a:xfrm>
+            <a:off x="3315854" y="797836"/>
+            <a:ext cx="1215506" cy="2372084"/>
+          </a:xfrm>
+          <a:custGeom>
+            <a:avLst/>
+            <a:gdLst>
+              <a:gd name="connsiteX0" fmla="*/ 0 w 1163612"/>
+              <a:gd name="connsiteY0" fmla="*/ 0 h 2001520"/>
+              <a:gd name="connsiteX1" fmla="*/ 287081 w 1163612"/>
+              <a:gd name="connsiteY1" fmla="*/ 0 h 2001520"/>
+              <a:gd name="connsiteX2" fmla="*/ 287081 w 1163612"/>
+              <a:gd name="connsiteY2" fmla="*/ 1639917 h 2001520"/>
+              <a:gd name="connsiteX3" fmla="*/ 889292 w 1163612"/>
+              <a:gd name="connsiteY3" fmla="*/ 1639917 h 2001520"/>
+              <a:gd name="connsiteX4" fmla="*/ 889292 w 1163612"/>
+              <a:gd name="connsiteY4" fmla="*/ 1452880 h 2001520"/>
+              <a:gd name="connsiteX5" fmla="*/ 1163612 w 1163612"/>
+              <a:gd name="connsiteY5" fmla="*/ 1727200 h 2001520"/>
+              <a:gd name="connsiteX6" fmla="*/ 889292 w 1163612"/>
+              <a:gd name="connsiteY6" fmla="*/ 2001520 h 2001520"/>
+              <a:gd name="connsiteX7" fmla="*/ 889292 w 1163612"/>
+              <a:gd name="connsiteY7" fmla="*/ 1814483 h 2001520"/>
+              <a:gd name="connsiteX8" fmla="*/ 287081 w 1163612"/>
+              <a:gd name="connsiteY8" fmla="*/ 1814483 h 2001520"/>
+              <a:gd name="connsiteX9" fmla="*/ 287081 w 1163612"/>
+              <a:gd name="connsiteY9" fmla="*/ 1818640 h 2001520"/>
+              <a:gd name="connsiteX10" fmla="*/ 0 w 1163612"/>
+              <a:gd name="connsiteY10" fmla="*/ 1818640 h 2001520"/>
+            </a:gdLst>
+            <a:ahLst/>
+            <a:cxnLst>
+              <a:cxn ang="0">
+                <a:pos x="connsiteX0" y="connsiteY0"/>
+              </a:cxn>
+              <a:cxn ang="0">
+                <a:pos x="connsiteX1" y="connsiteY1"/>
+              </a:cxn>
+              <a:cxn ang="0">
+                <a:pos x="connsiteX2" y="connsiteY2"/>
+              </a:cxn>
+              <a:cxn ang="0">
+                <a:pos x="connsiteX3" y="connsiteY3"/>
+              </a:cxn>
+              <a:cxn ang="0">
+                <a:pos x="connsiteX4" y="connsiteY4"/>
+              </a:cxn>
+              <a:cxn ang="0">
+                <a:pos x="connsiteX5" y="connsiteY5"/>
+              </a:cxn>
+              <a:cxn ang="0">
+                <a:pos x="connsiteX6" y="connsiteY6"/>
+              </a:cxn>
+              <a:cxn ang="0">
+                <a:pos x="connsiteX7" y="connsiteY7"/>
+              </a:cxn>
+              <a:cxn ang="0">
+                <a:pos x="connsiteX8" y="connsiteY8"/>
+              </a:cxn>
+              <a:cxn ang="0">
+                <a:pos x="connsiteX9" y="connsiteY9"/>
+              </a:cxn>
+              <a:cxn ang="0">
+                <a:pos x="connsiteX10" y="connsiteY10"/>
+              </a:cxn>
+            </a:cxnLst>
+            <a:rect l="l" t="t" r="r" b="b"/>
+            <a:pathLst>
+              <a:path w="1163612" h="2001520">
+                <a:moveTo>
+                  <a:pt x="0" y="0"/>
+                </a:moveTo>
+                <a:lnTo>
+                  <a:pt x="287081" y="0"/>
+                </a:lnTo>
+                <a:lnTo>
+                  <a:pt x="287081" y="1639917"/>
+                </a:lnTo>
+                <a:lnTo>
+                  <a:pt x="889292" y="1639917"/>
+                </a:lnTo>
+                <a:lnTo>
+                  <a:pt x="889292" y="1452880"/>
+                </a:lnTo>
+                <a:lnTo>
+                  <a:pt x="1163612" y="1727200"/>
+                </a:lnTo>
+                <a:lnTo>
+                  <a:pt x="889292" y="2001520"/>
+                </a:lnTo>
+                <a:lnTo>
+                  <a:pt x="889292" y="1814483"/>
+                </a:lnTo>
+                <a:lnTo>
+                  <a:pt x="287081" y="1814483"/>
+                </a:lnTo>
+                <a:lnTo>
+                  <a:pt x="287081" y="1818640"/>
+                </a:lnTo>
+                <a:lnTo>
+                  <a:pt x="0" y="1818640"/>
+                </a:lnTo>
+                <a:close/>
+              </a:path>
+            </a:pathLst>
+          </a:custGeom>
+          <a:solidFill>
+            <a:srgbClr val="0070C0"/>
+          </a:solidFill>
+        </p:spPr>
+        <p:style>
+          <a:lnRef idx="2">
+            <a:schemeClr val="accent5">
+              <a:shade val="50000"/>
+            </a:schemeClr>
+          </a:lnRef>
+          <a:fillRef idx="1">
+            <a:schemeClr val="accent5"/>
+          </a:fillRef>
+          <a:effectRef idx="0">
+            <a:schemeClr val="accent5"/>
+          </a:effectRef>
+          <a:fontRef idx="minor">
+            <a:schemeClr val="lt1"/>
+          </a:fontRef>
+        </p:style>
+        <p:txBody>
+          <a:bodyPr rtlCol="0" anchor="ctr"/>
+          <a:lstStyle/>
+          <a:p>
+            <a:pPr algn="ctr"/>
+            <a:endParaRPr lang="ko-KR" altLang="en-US" dirty="0">
+              <a:latin typeface="배달의민족 도현" panose="020B0600000101010101" pitchFamily="50" charset="-127"/>
+              <a:ea typeface="배달의민족 도현" panose="020B0600000101010101" pitchFamily="50" charset="-127"/>
+            </a:endParaRPr>
+          </a:p>
+        </p:txBody>
+      </p:sp>
+      <p:sp>
+        <p:nvSpPr>
+          <p:cNvPr id="2" name="TextBox 1"/>
+          <p:cNvSpPr txBox="1"/>
+          <p:nvPr/>
+        </p:nvSpPr>
+        <p:spPr>
+          <a:xfrm>
+            <a:off x="4612640" y="2661920"/>
+            <a:ext cx="4378960" cy="1200329"/>
+          </a:xfrm>
+          <a:prstGeom prst="rect">
+            <a:avLst/>
+          </a:prstGeom>
+          <a:noFill/>
+        </p:spPr>
+        <p:txBody>
+          <a:bodyPr wrap="square" rtlCol="0">
+            <a:spAutoFit/>
+          </a:bodyPr>
+          <a:lstStyle/>
+          <a:p>
+            <a:r>
+              <a:rPr lang="en-US" altLang="ko-KR" dirty="0" smtClean="0">
+                <a:solidFill>
+                  <a:schemeClr val="bg1"/>
+                </a:solidFill>
+                <a:latin typeface="배달의민족 도현" panose="020B0600000101010101" pitchFamily="50" charset="-127"/>
+                <a:ea typeface="배달의민족 도현" panose="020B0600000101010101" pitchFamily="50" charset="-127"/>
+              </a:rPr>
+              <a:t>Activity_main.xml?</a:t>
+            </a:r>
+          </a:p>
+          <a:p>
+            <a:r>
+              <a:rPr lang="en-US" altLang="ko-KR" dirty="0" err="1" smtClean="0">
+                <a:solidFill>
+                  <a:schemeClr val="bg1"/>
+                </a:solidFill>
+                <a:latin typeface="배달의민족 도현" panose="020B0600000101010101" pitchFamily="50" charset="-127"/>
+                <a:ea typeface="배달의민족 도현" panose="020B0600000101010101" pitchFamily="50" charset="-127"/>
+              </a:rPr>
+              <a:t>MainActivity</a:t>
+            </a:r>
+            <a:r>
+              <a:rPr lang="ko-KR" altLang="en-US" dirty="0" smtClean="0">
+                <a:solidFill>
+                  <a:schemeClr val="bg1"/>
+                </a:solidFill>
+                <a:latin typeface="배달의민족 도현" panose="020B0600000101010101" pitchFamily="50" charset="-127"/>
+                <a:ea typeface="배달의민족 도현" panose="020B0600000101010101" pitchFamily="50" charset="-127"/>
+              </a:rPr>
+              <a:t>의 화면을 나타내는 파일</a:t>
+            </a:r>
+            <a:endParaRPr lang="en-US" altLang="ko-KR" dirty="0" smtClean="0">
+              <a:solidFill>
+                <a:schemeClr val="bg1"/>
+              </a:solidFill>
+              <a:latin typeface="배달의민족 도현" panose="020B0600000101010101" pitchFamily="50" charset="-127"/>
+              <a:ea typeface="배달의민족 도현" panose="020B0600000101010101" pitchFamily="50" charset="-127"/>
+            </a:endParaRPr>
+          </a:p>
+          <a:p>
+            <a:endParaRPr lang="en-US" altLang="ko-KR" dirty="0" smtClean="0">
+              <a:solidFill>
+                <a:schemeClr val="bg1"/>
+              </a:solidFill>
+              <a:latin typeface="배달의민족 도현" panose="020B0600000101010101" pitchFamily="50" charset="-127"/>
+              <a:ea typeface="배달의민족 도현" panose="020B0600000101010101" pitchFamily="50" charset="-127"/>
+            </a:endParaRPr>
+          </a:p>
+          <a:p>
+            <a:r>
+              <a:rPr lang="ko-KR" altLang="en-US" dirty="0" smtClean="0">
+                <a:solidFill>
+                  <a:schemeClr val="bg1"/>
+                </a:solidFill>
+                <a:latin typeface="배달의민족 도현" panose="020B0600000101010101" pitchFamily="50" charset="-127"/>
+                <a:ea typeface="배달의민족 도현" panose="020B0600000101010101" pitchFamily="50" charset="-127"/>
+              </a:rPr>
+              <a:t>해당 화면을 구성하거나 꾸미는 역할</a:t>
+            </a:r>
+            <a:endParaRPr lang="ko-KR" altLang="en-US" dirty="0">
+              <a:solidFill>
+                <a:schemeClr val="bg1"/>
+              </a:solidFill>
+              <a:latin typeface="배달의민족 도현" panose="020B0600000101010101" pitchFamily="50" charset="-127"/>
+              <a:ea typeface="배달의민족 도현" panose="020B0600000101010101" pitchFamily="50" charset="-127"/>
+            </a:endParaRPr>
+          </a:p>
+        </p:txBody>
+      </p:sp>
+    </p:spTree>
+    <p:extLst>
+      <p:ext uri="{BB962C8B-B14F-4D97-AF65-F5344CB8AC3E}">
+        <p14:creationId xmlns:p14="http://schemas.microsoft.com/office/powerpoint/2010/main" val="3960888656"/>
+      </p:ext>
+    </p:extLst>
+  </p:cSld>
+  <p:clrMapOvr>
+    <a:masterClrMapping/>
+  </p:clrMapOvr>
+  <p:timing>
+    <p:tnLst>
+      <p:par>
+        <p:cTn id="1" dur="indefinite" restart="never" nodeType="tmRoot"/>
+      </p:par>
+    </p:tnLst>
+  </p:timing>
+</p:sld>
+</file>
+
+<file path=ppt/slides/slide16.xml><?xml version="1.0" encoding="utf-8"?>
+<p:sld xmlns:a="http://schemas.openxmlformats.org/drawingml/2006/main" xmlns:r="http://schemas.openxmlformats.org/officeDocument/2006/relationships" xmlns:p="http://schemas.openxmlformats.org/presentationml/2006/main">
+  <p:cSld>
+    <p:spTree>
+      <p:nvGrpSpPr>
+        <p:cNvPr id="1" name=""/>
+        <p:cNvGrpSpPr/>
+        <p:nvPr/>
+      </p:nvGrpSpPr>
+      <p:grpSpPr>
+        <a:xfrm>
+          <a:off x="0" y="0"/>
+          <a:ext cx="0" cy="0"/>
+          <a:chOff x="0" y="0"/>
+          <a:chExt cx="0" cy="0"/>
+        </a:xfrm>
+      </p:grpSpPr>
+      <p:pic>
+        <p:nvPicPr>
+          <p:cNvPr id="7" name="그림 6"/>
+          <p:cNvPicPr>
+            <a:picLocks noChangeAspect="1"/>
+          </p:cNvPicPr>
+          <p:nvPr/>
+        </p:nvPicPr>
+        <p:blipFill>
+          <a:blip r:embed="rId2"/>
+          <a:stretch>
+            <a:fillRect/>
+          </a:stretch>
+        </p:blipFill>
+        <p:spPr>
+          <a:xfrm>
+            <a:off x="0" y="42672"/>
+            <a:ext cx="12378267" cy="6962775"/>
+          </a:xfrm>
+          <a:prstGeom prst="rect">
+            <a:avLst/>
+          </a:prstGeom>
+        </p:spPr>
+      </p:pic>
+      <p:sp>
+        <p:nvSpPr>
+          <p:cNvPr id="8" name="직사각형 7"/>
+          <p:cNvSpPr/>
+          <p:nvPr/>
+        </p:nvSpPr>
+        <p:spPr>
+          <a:xfrm>
+            <a:off x="3513512" y="1059412"/>
+            <a:ext cx="3060007" cy="1023388"/>
+          </a:xfrm>
+          <a:prstGeom prst="rect">
+            <a:avLst/>
+          </a:prstGeom>
+          <a:noFill/>
+          <a:ln w="28575">
+            <a:solidFill>
+              <a:srgbClr val="FFFF00"/>
+            </a:solidFill>
+          </a:ln>
+        </p:spPr>
+        <p:style>
+          <a:lnRef idx="2">
+            <a:schemeClr val="accent1">
+              <a:shade val="50000"/>
+            </a:schemeClr>
+          </a:lnRef>
+          <a:fillRef idx="1">
+            <a:schemeClr val="accent1"/>
+          </a:fillRef>
+          <a:effectRef idx="0">
+            <a:schemeClr val="accent1"/>
+          </a:effectRef>
+          <a:fontRef idx="minor">
+            <a:schemeClr val="lt1"/>
+          </a:fontRef>
+        </p:style>
+        <p:txBody>
+          <a:bodyPr rtlCol="0" anchor="ctr"/>
+          <a:lstStyle/>
+          <a:p>
+            <a:pPr algn="ctr"/>
+            <a:endParaRPr lang="ko-KR" altLang="en-US" dirty="0">
+              <a:latin typeface="배달의민족 도현" panose="020B0600000101010101" pitchFamily="50" charset="-127"/>
+              <a:ea typeface="배달의민족 도현" panose="020B0600000101010101" pitchFamily="50" charset="-127"/>
+            </a:endParaRPr>
+          </a:p>
+        </p:txBody>
+      </p:sp>
+    </p:spTree>
+    <p:extLst>
+      <p:ext uri="{BB962C8B-B14F-4D97-AF65-F5344CB8AC3E}">
+        <p14:creationId xmlns:p14="http://schemas.microsoft.com/office/powerpoint/2010/main" val="2164168046"/>
+      </p:ext>
+    </p:extLst>
+  </p:cSld>
+  <p:clrMapOvr>
+    <a:masterClrMapping/>
+  </p:clrMapOvr>
+  <p:timing>
+    <p:tnLst>
+      <p:par>
+        <p:cTn id="1" dur="indefinite" restart="never" nodeType="tmRoot"/>
+      </p:par>
+    </p:tnLst>
+  </p:timing>
+</p:sld>
+</file>
+
+<file path=ppt/slides/slide17.xml><?xml version="1.0" encoding="utf-8"?>
+<p:sld xmlns:a="http://schemas.openxmlformats.org/drawingml/2006/main" xmlns:r="http://schemas.openxmlformats.org/officeDocument/2006/relationships" xmlns:p="http://schemas.openxmlformats.org/presentationml/2006/main">
+  <p:cSld>
+    <p:spTree>
+      <p:nvGrpSpPr>
+        <p:cNvPr id="1" name=""/>
+        <p:cNvGrpSpPr/>
+        <p:nvPr/>
+      </p:nvGrpSpPr>
+      <p:grpSpPr>
+        <a:xfrm>
+          <a:off x="0" y="0"/>
+          <a:ext cx="0" cy="0"/>
+          <a:chOff x="0" y="0"/>
+          <a:chExt cx="0" cy="0"/>
+        </a:xfrm>
+      </p:grpSpPr>
+      <p:pic>
+        <p:nvPicPr>
+          <p:cNvPr id="4" name="그림 3"/>
+          <p:cNvPicPr>
+            <a:picLocks noChangeAspect="1"/>
+          </p:cNvPicPr>
+          <p:nvPr/>
+        </p:nvPicPr>
+        <p:blipFill rotWithShape="1">
+          <a:blip r:embed="rId2"/>
+          <a:srcRect l="28460" t="14379" r="46821" b="70628"/>
+          <a:stretch/>
+        </p:blipFill>
+        <p:spPr>
+          <a:xfrm>
+            <a:off x="408879" y="1283782"/>
+            <a:ext cx="6503145" cy="2302698"/>
+          </a:xfrm>
+          <a:prstGeom prst="rect">
+            <a:avLst/>
+          </a:prstGeom>
+        </p:spPr>
+      </p:pic>
+      <p:sp>
+        <p:nvSpPr>
+          <p:cNvPr id="6" name="직사각형 5"/>
+          <p:cNvSpPr/>
+          <p:nvPr/>
+        </p:nvSpPr>
+        <p:spPr>
+          <a:xfrm>
+            <a:off x="1043709" y="1417783"/>
+            <a:ext cx="3883891" cy="461818"/>
+          </a:xfrm>
+          <a:prstGeom prst="rect">
+            <a:avLst/>
+          </a:prstGeom>
+          <a:noFill/>
+          <a:ln w="28575">
+            <a:solidFill>
+              <a:srgbClr val="FF0000"/>
+            </a:solidFill>
+          </a:ln>
+        </p:spPr>
+        <p:style>
+          <a:lnRef idx="2">
+            <a:schemeClr val="accent1">
+              <a:shade val="50000"/>
+            </a:schemeClr>
+          </a:lnRef>
+          <a:fillRef idx="1">
+            <a:schemeClr val="accent1"/>
+          </a:fillRef>
+          <a:effectRef idx="0">
+            <a:schemeClr val="accent1"/>
+          </a:effectRef>
+          <a:fontRef idx="minor">
+            <a:schemeClr val="lt1"/>
+          </a:fontRef>
+        </p:style>
+        <p:txBody>
+          <a:bodyPr rtlCol="0" anchor="ctr"/>
+          <a:lstStyle/>
+          <a:p>
+            <a:pPr algn="ctr"/>
+            <a:endParaRPr lang="ko-KR" altLang="en-US" dirty="0">
+              <a:latin typeface="배달의민족 도현" panose="020B0600000101010101" pitchFamily="50" charset="-127"/>
+              <a:ea typeface="배달의민족 도현" panose="020B0600000101010101" pitchFamily="50" charset="-127"/>
+            </a:endParaRPr>
+          </a:p>
+        </p:txBody>
+      </p:sp>
+      <p:sp>
+        <p:nvSpPr>
+          <p:cNvPr id="7" name="직사각형 6"/>
+          <p:cNvSpPr/>
+          <p:nvPr/>
+        </p:nvSpPr>
+        <p:spPr>
+          <a:xfrm>
+            <a:off x="877454" y="2013602"/>
+            <a:ext cx="5574146" cy="1237598"/>
+          </a:xfrm>
+          <a:prstGeom prst="rect">
+            <a:avLst/>
+          </a:prstGeom>
+          <a:noFill/>
+          <a:ln w="57150">
+            <a:solidFill>
+              <a:srgbClr val="0070C0"/>
+            </a:solidFill>
+          </a:ln>
+        </p:spPr>
+        <p:style>
+          <a:lnRef idx="2">
+            <a:schemeClr val="accent1">
+              <a:shade val="50000"/>
+            </a:schemeClr>
+          </a:lnRef>
+          <a:fillRef idx="1">
+            <a:schemeClr val="accent1"/>
+          </a:fillRef>
+          <a:effectRef idx="0">
+            <a:schemeClr val="accent1"/>
+          </a:effectRef>
+          <a:fontRef idx="minor">
+            <a:schemeClr val="lt1"/>
+          </a:fontRef>
+        </p:style>
+        <p:txBody>
+          <a:bodyPr rtlCol="0" anchor="ctr"/>
+          <a:lstStyle/>
+          <a:p>
+            <a:pPr algn="ctr"/>
+            <a:endParaRPr lang="ko-KR" altLang="en-US" dirty="0">
+              <a:latin typeface="배달의민족 도현" panose="020B0600000101010101" pitchFamily="50" charset="-127"/>
+              <a:ea typeface="배달의민족 도현" panose="020B0600000101010101" pitchFamily="50" charset="-127"/>
+            </a:endParaRPr>
+          </a:p>
+        </p:txBody>
+      </p:sp>
+      <p:sp>
+        <p:nvSpPr>
+          <p:cNvPr id="8" name="오른쪽 화살표 7"/>
+          <p:cNvSpPr/>
+          <p:nvPr/>
+        </p:nvSpPr>
+        <p:spPr>
+          <a:xfrm>
+            <a:off x="5415280" y="1374372"/>
+            <a:ext cx="1496744" cy="548640"/>
+          </a:xfrm>
+          <a:prstGeom prst="rightArrow">
+            <a:avLst>
+              <a:gd name="adj1" fmla="val 31818"/>
+              <a:gd name="adj2" fmla="val 50000"/>
+            </a:avLst>
+          </a:prstGeom>
+          <a:solidFill>
+            <a:srgbClr val="FF0000"/>
+          </a:solidFill>
+          <a:ln>
+            <a:solidFill>
+              <a:srgbClr val="FF0000"/>
+            </a:solidFill>
+          </a:ln>
+        </p:spPr>
+        <p:style>
+          <a:lnRef idx="2">
+            <a:schemeClr val="accent1">
+              <a:shade val="50000"/>
+            </a:schemeClr>
+          </a:lnRef>
+          <a:fillRef idx="1">
+            <a:schemeClr val="accent1"/>
+          </a:fillRef>
+          <a:effectRef idx="0">
+            <a:schemeClr val="accent1"/>
+          </a:effectRef>
+          <a:fontRef idx="minor">
+            <a:schemeClr val="lt1"/>
+          </a:fontRef>
+        </p:style>
+        <p:txBody>
+          <a:bodyPr rtlCol="0" anchor="ctr"/>
+          <a:lstStyle/>
+          <a:p>
+            <a:pPr algn="ctr"/>
+            <a:endParaRPr lang="ko-KR" altLang="en-US" dirty="0">
+              <a:latin typeface="배달의민족 도현" panose="020B0600000101010101" pitchFamily="50" charset="-127"/>
+              <a:ea typeface="배달의민족 도현" panose="020B0600000101010101" pitchFamily="50" charset="-127"/>
+            </a:endParaRPr>
+          </a:p>
+        </p:txBody>
+      </p:sp>
+      <p:sp>
+        <p:nvSpPr>
+          <p:cNvPr id="12" name="자유형 11"/>
+          <p:cNvSpPr/>
+          <p:nvPr/>
+        </p:nvSpPr>
+        <p:spPr>
+          <a:xfrm>
+            <a:off x="796174" y="3398796"/>
+            <a:ext cx="1163612" cy="2494004"/>
+          </a:xfrm>
+          <a:custGeom>
+            <a:avLst/>
+            <a:gdLst>
+              <a:gd name="connsiteX0" fmla="*/ 0 w 1163612"/>
+              <a:gd name="connsiteY0" fmla="*/ 0 h 2001520"/>
+              <a:gd name="connsiteX1" fmla="*/ 287081 w 1163612"/>
+              <a:gd name="connsiteY1" fmla="*/ 0 h 2001520"/>
+              <a:gd name="connsiteX2" fmla="*/ 287081 w 1163612"/>
+              <a:gd name="connsiteY2" fmla="*/ 1639917 h 2001520"/>
+              <a:gd name="connsiteX3" fmla="*/ 889292 w 1163612"/>
+              <a:gd name="connsiteY3" fmla="*/ 1639917 h 2001520"/>
+              <a:gd name="connsiteX4" fmla="*/ 889292 w 1163612"/>
+              <a:gd name="connsiteY4" fmla="*/ 1452880 h 2001520"/>
+              <a:gd name="connsiteX5" fmla="*/ 1163612 w 1163612"/>
+              <a:gd name="connsiteY5" fmla="*/ 1727200 h 2001520"/>
+              <a:gd name="connsiteX6" fmla="*/ 889292 w 1163612"/>
+              <a:gd name="connsiteY6" fmla="*/ 2001520 h 2001520"/>
+              <a:gd name="connsiteX7" fmla="*/ 889292 w 1163612"/>
+              <a:gd name="connsiteY7" fmla="*/ 1814483 h 2001520"/>
+              <a:gd name="connsiteX8" fmla="*/ 287081 w 1163612"/>
+              <a:gd name="connsiteY8" fmla="*/ 1814483 h 2001520"/>
+              <a:gd name="connsiteX9" fmla="*/ 287081 w 1163612"/>
+              <a:gd name="connsiteY9" fmla="*/ 1818640 h 2001520"/>
+              <a:gd name="connsiteX10" fmla="*/ 0 w 1163612"/>
+              <a:gd name="connsiteY10" fmla="*/ 1818640 h 2001520"/>
+            </a:gdLst>
+            <a:ahLst/>
+            <a:cxnLst>
+              <a:cxn ang="0">
+                <a:pos x="connsiteX0" y="connsiteY0"/>
+              </a:cxn>
+              <a:cxn ang="0">
+                <a:pos x="connsiteX1" y="connsiteY1"/>
+              </a:cxn>
+              <a:cxn ang="0">
+                <a:pos x="connsiteX2" y="connsiteY2"/>
+              </a:cxn>
+              <a:cxn ang="0">
+                <a:pos x="connsiteX3" y="connsiteY3"/>
+              </a:cxn>
+              <a:cxn ang="0">
+                <a:pos x="connsiteX4" y="connsiteY4"/>
+              </a:cxn>
+              <a:cxn ang="0">
+                <a:pos x="connsiteX5" y="connsiteY5"/>
+              </a:cxn>
+              <a:cxn ang="0">
+                <a:pos x="connsiteX6" y="connsiteY6"/>
+              </a:cxn>
+              <a:cxn ang="0">
+                <a:pos x="connsiteX7" y="connsiteY7"/>
+              </a:cxn>
+              <a:cxn ang="0">
+                <a:pos x="connsiteX8" y="connsiteY8"/>
+              </a:cxn>
+              <a:cxn ang="0">
+                <a:pos x="connsiteX9" y="connsiteY9"/>
+              </a:cxn>
+              <a:cxn ang="0">
+                <a:pos x="connsiteX10" y="connsiteY10"/>
+              </a:cxn>
+            </a:cxnLst>
+            <a:rect l="l" t="t" r="r" b="b"/>
+            <a:pathLst>
+              <a:path w="1163612" h="2001520">
+                <a:moveTo>
+                  <a:pt x="0" y="0"/>
+                </a:moveTo>
+                <a:lnTo>
+                  <a:pt x="287081" y="0"/>
+                </a:lnTo>
+                <a:lnTo>
+                  <a:pt x="287081" y="1639917"/>
+                </a:lnTo>
+                <a:lnTo>
+                  <a:pt x="889292" y="1639917"/>
+                </a:lnTo>
+                <a:lnTo>
+                  <a:pt x="889292" y="1452880"/>
+                </a:lnTo>
+                <a:lnTo>
+                  <a:pt x="1163612" y="1727200"/>
+                </a:lnTo>
+                <a:lnTo>
+                  <a:pt x="889292" y="2001520"/>
+                </a:lnTo>
+                <a:lnTo>
+                  <a:pt x="889292" y="1814483"/>
+                </a:lnTo>
+                <a:lnTo>
+                  <a:pt x="287081" y="1814483"/>
+                </a:lnTo>
+                <a:lnTo>
+                  <a:pt x="287081" y="1818640"/>
+                </a:lnTo>
+                <a:lnTo>
+                  <a:pt x="0" y="1818640"/>
+                </a:lnTo>
+                <a:close/>
+              </a:path>
+            </a:pathLst>
+          </a:custGeom>
+          <a:solidFill>
+            <a:srgbClr val="0070C0"/>
+          </a:solidFill>
+        </p:spPr>
+        <p:style>
+          <a:lnRef idx="2">
+            <a:schemeClr val="accent5">
+              <a:shade val="50000"/>
+            </a:schemeClr>
+          </a:lnRef>
+          <a:fillRef idx="1">
+            <a:schemeClr val="accent5"/>
+          </a:fillRef>
+          <a:effectRef idx="0">
+            <a:schemeClr val="accent5"/>
+          </a:effectRef>
+          <a:fontRef idx="minor">
+            <a:schemeClr val="lt1"/>
+          </a:fontRef>
+        </p:style>
+        <p:txBody>
+          <a:bodyPr rtlCol="0" anchor="ctr"/>
+          <a:lstStyle/>
+          <a:p>
+            <a:pPr algn="ctr"/>
+            <a:endParaRPr lang="ko-KR" altLang="en-US" dirty="0">
+              <a:latin typeface="배달의민족 도현" panose="020B0600000101010101" pitchFamily="50" charset="-127"/>
+              <a:ea typeface="배달의민족 도현" panose="020B0600000101010101" pitchFamily="50" charset="-127"/>
+            </a:endParaRPr>
+          </a:p>
+        </p:txBody>
+      </p:sp>
+      <p:sp>
+        <p:nvSpPr>
+          <p:cNvPr id="13" name="TextBox 12"/>
+          <p:cNvSpPr txBox="1"/>
+          <p:nvPr/>
+        </p:nvSpPr>
+        <p:spPr>
+          <a:xfrm>
+            <a:off x="7086430" y="1332883"/>
+            <a:ext cx="5069016" cy="707886"/>
+          </a:xfrm>
+          <a:prstGeom prst="rect">
+            <a:avLst/>
+          </a:prstGeom>
+          <a:noFill/>
+        </p:spPr>
+        <p:txBody>
+          <a:bodyPr wrap="none" rtlCol="0">
+            <a:spAutoFit/>
+          </a:bodyPr>
+          <a:lstStyle/>
+          <a:p>
+            <a:r>
+              <a:rPr lang="ko-KR" altLang="en-US" sz="2400" dirty="0" err="1" smtClean="0">
+                <a:latin typeface="배달의민족 도현" panose="020B0600000101010101" pitchFamily="50" charset="-127"/>
+                <a:ea typeface="배달의민족 도현" panose="020B0600000101010101" pitchFamily="50" charset="-127"/>
+              </a:rPr>
+              <a:t>액티비티를</a:t>
+            </a:r>
+            <a:r>
+              <a:rPr lang="ko-KR" altLang="en-US" sz="2400" dirty="0" smtClean="0">
+                <a:latin typeface="배달의민족 도현" panose="020B0600000101010101" pitchFamily="50" charset="-127"/>
+                <a:ea typeface="배달의민족 도현" panose="020B0600000101010101" pitchFamily="50" charset="-127"/>
+              </a:rPr>
+              <a:t> 상속 받은 </a:t>
+            </a:r>
+            <a:r>
+              <a:rPr lang="en-US" altLang="ko-KR" sz="2400" dirty="0" err="1" smtClean="0">
+                <a:latin typeface="배달의민족 도현" panose="020B0600000101010101" pitchFamily="50" charset="-127"/>
+                <a:ea typeface="배달의민족 도현" panose="020B0600000101010101" pitchFamily="50" charset="-127"/>
+              </a:rPr>
+              <a:t>MainActivity</a:t>
+            </a:r>
+            <a:endParaRPr lang="en-US" altLang="ko-KR" sz="2400" dirty="0" smtClean="0">
+              <a:latin typeface="배달의민족 도현" panose="020B0600000101010101" pitchFamily="50" charset="-127"/>
+              <a:ea typeface="배달의민족 도현" panose="020B0600000101010101" pitchFamily="50" charset="-127"/>
+            </a:endParaRPr>
+          </a:p>
+          <a:p>
+            <a:r>
+              <a:rPr lang="en-US" altLang="ko-KR" sz="1600" dirty="0">
+                <a:latin typeface="배달의민족 도현" panose="020B0600000101010101" pitchFamily="50" charset="-127"/>
+                <a:ea typeface="배달의민족 도현" panose="020B0600000101010101" pitchFamily="50" charset="-127"/>
+              </a:rPr>
+              <a:t>(</a:t>
+            </a:r>
+            <a:r>
+              <a:rPr lang="en-US" altLang="ko-KR" sz="1600" dirty="0" err="1">
+                <a:latin typeface="배달의민족 도현" panose="020B0600000101010101" pitchFamily="50" charset="-127"/>
+                <a:ea typeface="배달의민족 도현" panose="020B0600000101010101" pitchFamily="50" charset="-127"/>
+              </a:rPr>
+              <a:t>AppCompatActivity</a:t>
+            </a:r>
+            <a:r>
+              <a:rPr lang="ko-KR" altLang="en-US" sz="1600" dirty="0">
+                <a:latin typeface="배달의민족 도현" panose="020B0600000101010101" pitchFamily="50" charset="-127"/>
+                <a:ea typeface="배달의민족 도현" panose="020B0600000101010101" pitchFamily="50" charset="-127"/>
+              </a:rPr>
+              <a:t>는 </a:t>
+            </a:r>
+            <a:r>
+              <a:rPr lang="en-US" altLang="ko-KR" sz="1600" dirty="0">
+                <a:latin typeface="배달의민족 도현" panose="020B0600000101010101" pitchFamily="50" charset="-127"/>
+                <a:ea typeface="배달의민족 도현" panose="020B0600000101010101" pitchFamily="50" charset="-127"/>
+              </a:rPr>
+              <a:t>Activity</a:t>
+            </a:r>
+            <a:r>
+              <a:rPr lang="ko-KR" altLang="en-US" sz="1600" dirty="0">
+                <a:latin typeface="배달의민족 도현" panose="020B0600000101010101" pitchFamily="50" charset="-127"/>
+                <a:ea typeface="배달의민족 도현" panose="020B0600000101010101" pitchFamily="50" charset="-127"/>
+              </a:rPr>
+              <a:t>를 상속받은 클래스</a:t>
+            </a:r>
+            <a:r>
+              <a:rPr lang="en-US" altLang="ko-KR" sz="1600" dirty="0">
+                <a:latin typeface="배달의민족 도현" panose="020B0600000101010101" pitchFamily="50" charset="-127"/>
+                <a:ea typeface="배달의민족 도현" panose="020B0600000101010101" pitchFamily="50" charset="-127"/>
+              </a:rPr>
+              <a:t>)</a:t>
+            </a:r>
+            <a:endParaRPr lang="ko-KR" altLang="en-US" sz="1600" dirty="0">
+              <a:latin typeface="배달의민족 도현" panose="020B0600000101010101" pitchFamily="50" charset="-127"/>
+              <a:ea typeface="배달의민족 도현" panose="020B0600000101010101" pitchFamily="50" charset="-127"/>
+            </a:endParaRPr>
+          </a:p>
+        </p:txBody>
+      </p:sp>
+      <p:sp>
+        <p:nvSpPr>
+          <p:cNvPr id="14" name="TextBox 13"/>
+          <p:cNvSpPr txBox="1"/>
+          <p:nvPr/>
+        </p:nvSpPr>
+        <p:spPr>
+          <a:xfrm>
+            <a:off x="2100469" y="5339695"/>
+            <a:ext cx="5923416" cy="461665"/>
+          </a:xfrm>
+          <a:prstGeom prst="rect">
+            <a:avLst/>
+          </a:prstGeom>
+          <a:noFill/>
+        </p:spPr>
+        <p:txBody>
+          <a:bodyPr wrap="none" rtlCol="0">
+            <a:spAutoFit/>
+          </a:bodyPr>
+          <a:lstStyle/>
+          <a:p>
+            <a:r>
+              <a:rPr lang="ko-KR" altLang="en-US" sz="2400" dirty="0" err="1" smtClean="0">
+                <a:latin typeface="배달의민족 도현" panose="020B0600000101010101" pitchFamily="50" charset="-127"/>
+                <a:ea typeface="배달의민족 도현" panose="020B0600000101010101" pitchFamily="50" charset="-127"/>
+              </a:rPr>
+              <a:t>액티비티</a:t>
+            </a:r>
+            <a:r>
+              <a:rPr lang="ko-KR" altLang="en-US" sz="2400" dirty="0" smtClean="0">
+                <a:latin typeface="배달의민족 도현" panose="020B0600000101010101" pitchFamily="50" charset="-127"/>
+                <a:ea typeface="배달의민족 도현" panose="020B0600000101010101" pitchFamily="50" charset="-127"/>
+              </a:rPr>
+              <a:t> 생성시 자동으로 호출되는 </a:t>
+            </a:r>
+            <a:r>
+              <a:rPr lang="ko-KR" altLang="en-US" sz="2400" dirty="0" err="1" smtClean="0">
+                <a:latin typeface="배달의민족 도현" panose="020B0600000101010101" pitchFamily="50" charset="-127"/>
+                <a:ea typeface="배달의민족 도현" panose="020B0600000101010101" pitchFamily="50" charset="-127"/>
+              </a:rPr>
+              <a:t>메소드</a:t>
+            </a:r>
+            <a:endParaRPr lang="en-US" altLang="ko-KR" sz="2400" dirty="0" smtClean="0">
+              <a:latin typeface="배달의민족 도현" panose="020B0600000101010101" pitchFamily="50" charset="-127"/>
+              <a:ea typeface="배달의민족 도현" panose="020B0600000101010101" pitchFamily="50" charset="-127"/>
+            </a:endParaRPr>
+          </a:p>
+        </p:txBody>
+      </p:sp>
+      <p:sp>
+        <p:nvSpPr>
+          <p:cNvPr id="15" name="TextBox 14"/>
+          <p:cNvSpPr txBox="1"/>
+          <p:nvPr/>
+        </p:nvSpPr>
+        <p:spPr>
+          <a:xfrm>
+            <a:off x="336884" y="320842"/>
+            <a:ext cx="3788217" cy="461665"/>
+          </a:xfrm>
+          <a:prstGeom prst="rect">
+            <a:avLst/>
+          </a:prstGeom>
+          <a:noFill/>
+        </p:spPr>
+        <p:txBody>
+          <a:bodyPr wrap="none" rtlCol="0">
+            <a:spAutoFit/>
+          </a:bodyPr>
+          <a:lstStyle/>
+          <a:p>
+            <a:r>
+              <a:rPr lang="ko-KR" altLang="en-US" sz="2400" dirty="0" smtClean="0">
+                <a:solidFill>
+                  <a:srgbClr val="A4C639"/>
+                </a:solidFill>
+                <a:latin typeface="배달의민족 도현" panose="020B0600000101010101" pitchFamily="50" charset="-127"/>
+                <a:ea typeface="배달의민족 도현" panose="020B0600000101010101" pitchFamily="50" charset="-127"/>
+              </a:rPr>
+              <a:t>프로젝트 생성시 </a:t>
+            </a:r>
+            <a:r>
+              <a:rPr lang="ko-KR" altLang="en-US" sz="2400" dirty="0" err="1" smtClean="0">
+                <a:solidFill>
+                  <a:srgbClr val="A4C639"/>
+                </a:solidFill>
+                <a:latin typeface="배달의민족 도현" panose="020B0600000101010101" pitchFamily="50" charset="-127"/>
+                <a:ea typeface="배달의민족 도현" panose="020B0600000101010101" pitchFamily="50" charset="-127"/>
+              </a:rPr>
+              <a:t>자바코드</a:t>
+            </a:r>
+            <a:endParaRPr lang="ko-KR" altLang="en-US" sz="2400" dirty="0">
+              <a:solidFill>
+                <a:srgbClr val="A4C639"/>
+              </a:solidFill>
+              <a:latin typeface="배달의민족 도현" panose="020B0600000101010101" pitchFamily="50" charset="-127"/>
+              <a:ea typeface="배달의민족 도현" panose="020B0600000101010101" pitchFamily="50" charset="-127"/>
+            </a:endParaRPr>
+          </a:p>
+        </p:txBody>
+      </p:sp>
+      <p:sp>
+        <p:nvSpPr>
+          <p:cNvPr id="16" name="TextBox 15"/>
+          <p:cNvSpPr txBox="1"/>
+          <p:nvPr/>
+        </p:nvSpPr>
+        <p:spPr>
+          <a:xfrm>
+            <a:off x="8401813" y="2631333"/>
+            <a:ext cx="3476446" cy="1754326"/>
+          </a:xfrm>
+          <a:prstGeom prst="rect">
+            <a:avLst/>
+          </a:prstGeom>
+          <a:noFill/>
+        </p:spPr>
+        <p:txBody>
+          <a:bodyPr wrap="square" rtlCol="0">
+            <a:spAutoFit/>
+          </a:bodyPr>
+          <a:lstStyle/>
+          <a:p>
+            <a:r>
+              <a:rPr lang="en-US" altLang="ko-KR" dirty="0" smtClean="0">
+                <a:latin typeface="배달의민족 도현" panose="020B0600000101010101" pitchFamily="50" charset="-127"/>
+                <a:ea typeface="배달의민족 도현" panose="020B0600000101010101" pitchFamily="50" charset="-127"/>
+              </a:rPr>
+              <a:t>Activity?</a:t>
+            </a:r>
+          </a:p>
+          <a:p>
+            <a:r>
+              <a:rPr lang="ko-KR" altLang="en-US" dirty="0">
+                <a:latin typeface="배달의민족 도현" panose="020B0600000101010101" pitchFamily="50" charset="-127"/>
+                <a:ea typeface="배달의민족 도현" panose="020B0600000101010101" pitchFamily="50" charset="-127"/>
+              </a:rPr>
+              <a:t>사용자에게 </a:t>
+            </a:r>
+            <a:r>
+              <a:rPr lang="en-US" altLang="ko-KR" dirty="0">
+                <a:latin typeface="배달의민족 도현" panose="020B0600000101010101" pitchFamily="50" charset="-127"/>
+                <a:ea typeface="배달의민족 도현" panose="020B0600000101010101" pitchFamily="50" charset="-127"/>
+              </a:rPr>
+              <a:t>UI</a:t>
+            </a:r>
+            <a:r>
+              <a:rPr lang="ko-KR" altLang="en-US" dirty="0">
+                <a:latin typeface="배달의민족 도현" panose="020B0600000101010101" pitchFamily="50" charset="-127"/>
+                <a:ea typeface="배달의민족 도현" panose="020B0600000101010101" pitchFamily="50" charset="-127"/>
+              </a:rPr>
+              <a:t>가 있는 화면을 </a:t>
+            </a:r>
+            <a:endParaRPr lang="en-US" altLang="ko-KR" dirty="0" smtClean="0">
+              <a:latin typeface="배달의민족 도현" panose="020B0600000101010101" pitchFamily="50" charset="-127"/>
+              <a:ea typeface="배달의민족 도현" panose="020B0600000101010101" pitchFamily="50" charset="-127"/>
+            </a:endParaRPr>
+          </a:p>
+          <a:p>
+            <a:r>
+              <a:rPr lang="ko-KR" altLang="en-US" dirty="0" smtClean="0">
+                <a:latin typeface="배달의민족 도현" panose="020B0600000101010101" pitchFamily="50" charset="-127"/>
+                <a:ea typeface="배달의민족 도현" panose="020B0600000101010101" pitchFamily="50" charset="-127"/>
+              </a:rPr>
+              <a:t>제공하는 </a:t>
+            </a:r>
+            <a:r>
+              <a:rPr lang="ko-KR" altLang="en-US" dirty="0">
+                <a:latin typeface="배달의민족 도현" panose="020B0600000101010101" pitchFamily="50" charset="-127"/>
+                <a:ea typeface="배달의민족 도현" panose="020B0600000101010101" pitchFamily="50" charset="-127"/>
+              </a:rPr>
+              <a:t>앱 </a:t>
+            </a:r>
+            <a:r>
+              <a:rPr lang="ko-KR" altLang="en-US" dirty="0" smtClean="0">
+                <a:latin typeface="배달의민족 도현" panose="020B0600000101010101" pitchFamily="50" charset="-127"/>
+                <a:ea typeface="배달의민족 도현" panose="020B0600000101010101" pitchFamily="50" charset="-127"/>
+              </a:rPr>
+              <a:t>컴포넌트</a:t>
+            </a:r>
+            <a:endParaRPr lang="en-US" altLang="ko-KR" dirty="0" smtClean="0">
+              <a:latin typeface="배달의민족 도현" panose="020B0600000101010101" pitchFamily="50" charset="-127"/>
+              <a:ea typeface="배달의민족 도현" panose="020B0600000101010101" pitchFamily="50" charset="-127"/>
+            </a:endParaRPr>
+          </a:p>
+          <a:p>
+            <a:endParaRPr lang="en-US" altLang="ko-KR" dirty="0">
+              <a:latin typeface="배달의민족 도현" panose="020B0600000101010101" pitchFamily="50" charset="-127"/>
+              <a:ea typeface="배달의민족 도현" panose="020B0600000101010101" pitchFamily="50" charset="-127"/>
+            </a:endParaRPr>
+          </a:p>
+          <a:p>
+            <a:r>
+              <a:rPr lang="ko-KR" altLang="en-US" dirty="0" smtClean="0">
+                <a:latin typeface="배달의민족 도현" panose="020B0600000101010101" pitchFamily="50" charset="-127"/>
+                <a:ea typeface="배달의민족 도현" panose="020B0600000101010101" pitchFamily="50" charset="-127"/>
+              </a:rPr>
+              <a:t>쉽게 말해 </a:t>
+            </a:r>
+            <a:r>
+              <a:rPr lang="en-US" altLang="ko-KR" dirty="0" smtClean="0">
+                <a:latin typeface="배달의민족 도현" panose="020B0600000101010101" pitchFamily="50" charset="-127"/>
+                <a:ea typeface="배달의민족 도현" panose="020B0600000101010101" pitchFamily="50" charset="-127"/>
+              </a:rPr>
+              <a:t>xml</a:t>
+            </a:r>
+            <a:r>
+              <a:rPr lang="ko-KR" altLang="en-US" dirty="0" smtClean="0">
+                <a:latin typeface="배달의민족 도현" panose="020B0600000101010101" pitchFamily="50" charset="-127"/>
+                <a:ea typeface="배달의민족 도현" panose="020B0600000101010101" pitchFamily="50" charset="-127"/>
+              </a:rPr>
+              <a:t>은 화면을 꾸미고 </a:t>
+            </a:r>
+            <a:endParaRPr lang="en-US" altLang="ko-KR" dirty="0" smtClean="0">
+              <a:latin typeface="배달의민족 도현" panose="020B0600000101010101" pitchFamily="50" charset="-127"/>
+              <a:ea typeface="배달의민족 도현" panose="020B0600000101010101" pitchFamily="50" charset="-127"/>
+            </a:endParaRPr>
+          </a:p>
+          <a:p>
+            <a:r>
+              <a:rPr lang="ko-KR" altLang="en-US" dirty="0" err="1" smtClean="0">
+                <a:latin typeface="배달의민족 도현" panose="020B0600000101010101" pitchFamily="50" charset="-127"/>
+                <a:ea typeface="배달의민족 도현" panose="020B0600000101010101" pitchFamily="50" charset="-127"/>
+              </a:rPr>
+              <a:t>액티비티는</a:t>
+            </a:r>
+            <a:r>
+              <a:rPr lang="ko-KR" altLang="en-US" dirty="0" smtClean="0">
+                <a:latin typeface="배달의민족 도현" panose="020B0600000101010101" pitchFamily="50" charset="-127"/>
+                <a:ea typeface="배달의민족 도현" panose="020B0600000101010101" pitchFamily="50" charset="-127"/>
+              </a:rPr>
+              <a:t> 화면을 만들고 제공</a:t>
+            </a:r>
+            <a:endParaRPr lang="en-US" altLang="ko-KR" dirty="0" smtClean="0">
+              <a:latin typeface="배달의민족 도현" panose="020B0600000101010101" pitchFamily="50" charset="-127"/>
+              <a:ea typeface="배달의민족 도현" panose="020B0600000101010101" pitchFamily="50" charset="-127"/>
+            </a:endParaRPr>
+          </a:p>
+        </p:txBody>
+      </p:sp>
+    </p:spTree>
+    <p:extLst>
+      <p:ext uri="{BB962C8B-B14F-4D97-AF65-F5344CB8AC3E}">
+        <p14:creationId xmlns:p14="http://schemas.microsoft.com/office/powerpoint/2010/main" val="2463716181"/>
+      </p:ext>
+    </p:extLst>
+  </p:cSld>
+  <p:clrMapOvr>
+    <a:masterClrMapping/>
+  </p:clrMapOvr>
+  <p:timing>
+    <p:tnLst>
+      <p:par>
+        <p:cTn id="1" dur="indefinite" restart="never" nodeType="tmRoot"/>
+      </p:par>
+    </p:tnLst>
+  </p:timing>
+</p:sld>
+</file>
+
+<file path=ppt/slides/slide18.xml><?xml version="1.0" encoding="utf-8"?>
+<p:sld xmlns:a="http://schemas.openxmlformats.org/drawingml/2006/main" xmlns:r="http://schemas.openxmlformats.org/officeDocument/2006/relationships" xmlns:p="http://schemas.openxmlformats.org/presentationml/2006/main">
+  <p:cSld>
+    <p:spTree>
+      <p:nvGrpSpPr>
+        <p:cNvPr id="1" name=""/>
+        <p:cNvGrpSpPr/>
+        <p:nvPr/>
+      </p:nvGrpSpPr>
+      <p:grpSpPr>
+        <a:xfrm>
+          <a:off x="0" y="0"/>
+          <a:ext cx="0" cy="0"/>
+          <a:chOff x="0" y="0"/>
+          <a:chExt cx="0" cy="0"/>
+        </a:xfrm>
+      </p:grpSpPr>
+      <p:sp>
+        <p:nvSpPr>
+          <p:cNvPr id="2" name="TextBox 1"/>
+          <p:cNvSpPr txBox="1"/>
+          <p:nvPr/>
+        </p:nvSpPr>
+        <p:spPr>
+          <a:xfrm>
+            <a:off x="4378960" y="2286000"/>
+            <a:ext cx="4246880" cy="1569660"/>
+          </a:xfrm>
+          <a:prstGeom prst="rect">
+            <a:avLst/>
+          </a:prstGeom>
+          <a:noFill/>
+        </p:spPr>
+        <p:txBody>
+          <a:bodyPr wrap="square" rtlCol="0">
+            <a:spAutoFit/>
+          </a:bodyPr>
+          <a:lstStyle/>
+          <a:p>
+            <a:r>
+              <a:rPr lang="en-US" altLang="ko-KR" sz="9600" dirty="0" smtClean="0">
+                <a:latin typeface="배달의민족 도현" panose="020B0600000101010101" pitchFamily="50" charset="-127"/>
+                <a:ea typeface="배달의민족 도현" panose="020B0600000101010101" pitchFamily="50" charset="-127"/>
+              </a:rPr>
+              <a:t>Q&amp;A</a:t>
+            </a:r>
+            <a:endParaRPr lang="ko-KR" altLang="en-US" sz="9600" dirty="0">
+              <a:latin typeface="배달의민족 도현" panose="020B0600000101010101" pitchFamily="50" charset="-127"/>
+              <a:ea typeface="배달의민족 도현" panose="020B0600000101010101" pitchFamily="50" charset="-127"/>
+            </a:endParaRPr>
+          </a:p>
+        </p:txBody>
+      </p:sp>
+    </p:spTree>
+    <p:extLst>
+      <p:ext uri="{BB962C8B-B14F-4D97-AF65-F5344CB8AC3E}">
+        <p14:creationId xmlns:p14="http://schemas.microsoft.com/office/powerpoint/2010/main" val="3791870922"/>
+      </p:ext>
+    </p:extLst>
+  </p:cSld>
+  <p:clrMapOvr>
+    <a:masterClrMapping/>
+  </p:clrMapOvr>
+  <p:timing>
+    <p:tnLst>
+      <p:par>
+        <p:cTn id="1" dur="indefinite" restart="never" nodeType="tmRoot"/>
+      </p:par>
+    </p:tnLst>
+  </p:timing>
+</p:sld>
+</file>
+
 <file path=ppt/slides/slide2.xml><?xml version="1.0" encoding="utf-8"?>
 <p:sld xmlns:a="http://schemas.openxmlformats.org/drawingml/2006/main" xmlns:r="http://schemas.openxmlformats.org/officeDocument/2006/relationships" xmlns:p="http://schemas.openxmlformats.org/presentationml/2006/main">
   <p:cSld>
@@ -3988,14 +6548,41 @@
       </p:grpSpPr>
       <p:sp>
         <p:nvSpPr>
+          <p:cNvPr id="3" name="제목 2"/>
+          <p:cNvSpPr>
+            <a:spLocks noGrp="1"/>
+          </p:cNvSpPr>
+          <p:nvPr>
+            <p:ph type="title"/>
+          </p:nvPr>
+        </p:nvSpPr>
+        <p:spPr/>
+        <p:txBody>
+          <a:bodyPr/>
+          <a:lstStyle/>
+          <a:p>
+            <a:r>
+              <a:rPr lang="ko-KR" altLang="en-US" dirty="0" smtClean="0"/>
+              <a:t>객체지향이란</a:t>
+            </a:r>
+            <a:r>
+              <a:rPr lang="en-US" altLang="ko-KR" dirty="0" smtClean="0"/>
+              <a:t>?</a:t>
+            </a:r>
+            <a:endParaRPr lang="ko-KR" altLang="en-US" dirty="0"/>
+          </a:p>
+        </p:txBody>
+      </p:sp>
+      <p:sp>
+        <p:nvSpPr>
           <p:cNvPr id="2" name="TextBox 1"/>
           <p:cNvSpPr txBox="1"/>
           <p:nvPr/>
         </p:nvSpPr>
         <p:spPr>
           <a:xfrm>
-            <a:off x="336884" y="320842"/>
-            <a:ext cx="1757212" cy="461665"/>
+            <a:off x="838200" y="1831365"/>
+            <a:ext cx="9873762" cy="2031325"/>
           </a:xfrm>
           <a:prstGeom prst="rect">
             <a:avLst/>
@@ -4003,35 +6590,212 @@
           <a:noFill/>
         </p:spPr>
         <p:txBody>
-          <a:bodyPr wrap="none" rtlCol="0">
+          <a:bodyPr wrap="square" rtlCol="0">
             <a:spAutoFit/>
           </a:bodyPr>
           <a:lstStyle/>
           <a:p>
             <a:r>
-              <a:rPr lang="ko-KR" altLang="en-US" sz="2400" dirty="0">
-                <a:solidFill>
-                  <a:srgbClr val="A4C639"/>
-                </a:solidFill>
-                <a:latin typeface="배달의민족 도현" panose="020B0600000101010101" pitchFamily="50" charset="-127"/>
-                <a:ea typeface="배달의민족 도현" panose="020B0600000101010101" pitchFamily="50" charset="-127"/>
-              </a:rPr>
-              <a:t>두</a:t>
-            </a:r>
-            <a:r>
-              <a:rPr lang="ko-KR" altLang="en-US" sz="2400" dirty="0" smtClean="0">
-                <a:solidFill>
-                  <a:srgbClr val="A4C639"/>
-                </a:solidFill>
-                <a:latin typeface="배달의민족 도현" panose="020B0600000101010101" pitchFamily="50" charset="-127"/>
-                <a:ea typeface="배달의민족 도현" panose="020B0600000101010101" pitchFamily="50" charset="-127"/>
-              </a:rPr>
-              <a:t>번째 시간</a:t>
-            </a:r>
-            <a:endParaRPr lang="ko-KR" altLang="en-US" sz="2400" dirty="0">
-              <a:solidFill>
-                <a:srgbClr val="A4C639"/>
-              </a:solidFill>
+              <a:rPr lang="en-US" altLang="ko-KR" dirty="0">
+                <a:latin typeface="배달의민족 도현" panose="020B0600000101010101" pitchFamily="50" charset="-127"/>
+                <a:ea typeface="배달의민족 도현" panose="020B0600000101010101" pitchFamily="50" charset="-127"/>
+              </a:rPr>
+              <a:t>Object-Oriented Programming (OOP)</a:t>
+            </a:r>
+            <a:r>
+              <a:rPr lang="ko-KR" altLang="en-US" dirty="0">
+                <a:latin typeface="배달의민족 도현" panose="020B0600000101010101" pitchFamily="50" charset="-127"/>
+                <a:ea typeface="배달의민족 도현" panose="020B0600000101010101" pitchFamily="50" charset="-127"/>
+              </a:rPr>
+              <a:t/>
+            </a:r>
+            <a:br>
+              <a:rPr lang="ko-KR" altLang="en-US" dirty="0">
+                <a:latin typeface="배달의민족 도현" panose="020B0600000101010101" pitchFamily="50" charset="-127"/>
+                <a:ea typeface="배달의민족 도현" panose="020B0600000101010101" pitchFamily="50" charset="-127"/>
+              </a:rPr>
+            </a:br>
+            <a:r>
+              <a:rPr lang="ko-KR" altLang="en-US" dirty="0">
+                <a:latin typeface="배달의민족 도현" panose="020B0600000101010101" pitchFamily="50" charset="-127"/>
+                <a:ea typeface="배달의민족 도현" panose="020B0600000101010101" pitchFamily="50" charset="-127"/>
+              </a:rPr>
+              <a:t/>
+            </a:r>
+            <a:br>
+              <a:rPr lang="ko-KR" altLang="en-US" dirty="0">
+                <a:latin typeface="배달의민족 도현" panose="020B0600000101010101" pitchFamily="50" charset="-127"/>
+                <a:ea typeface="배달의민족 도현" panose="020B0600000101010101" pitchFamily="50" charset="-127"/>
+              </a:rPr>
+            </a:br>
+            <a:r>
+              <a:rPr lang="ko-KR" altLang="en-US" dirty="0">
+                <a:latin typeface="배달의민족 도현" panose="020B0600000101010101" pitchFamily="50" charset="-127"/>
+                <a:ea typeface="배달의민족 도현" panose="020B0600000101010101" pitchFamily="50" charset="-127"/>
+                <a:hlinkClick r:id="rId2" tooltip="프로그램"/>
+              </a:rPr>
+              <a:t>프로그램</a:t>
+            </a:r>
+            <a:r>
+              <a:rPr lang="ko-KR" altLang="en-US" dirty="0">
+                <a:latin typeface="배달의민족 도현" panose="020B0600000101010101" pitchFamily="50" charset="-127"/>
+                <a:ea typeface="배달의민족 도현" panose="020B0600000101010101" pitchFamily="50" charset="-127"/>
+              </a:rPr>
+              <a:t> 설계방법론이자 개념의 일종</a:t>
+            </a:r>
+            <a:r>
+              <a:rPr lang="en-US" altLang="ko-KR" dirty="0">
+                <a:latin typeface="배달의민족 도현" panose="020B0600000101010101" pitchFamily="50" charset="-127"/>
+                <a:ea typeface="배달의민족 도현" panose="020B0600000101010101" pitchFamily="50" charset="-127"/>
+              </a:rPr>
+              <a:t>.</a:t>
+            </a:r>
+            <a:r>
+              <a:rPr lang="ko-KR" altLang="en-US" dirty="0">
+                <a:latin typeface="배달의민족 도현" panose="020B0600000101010101" pitchFamily="50" charset="-127"/>
+                <a:ea typeface="배달의민족 도현" panose="020B0600000101010101" pitchFamily="50" charset="-127"/>
+              </a:rPr>
+              <a:t/>
+            </a:r>
+            <a:br>
+              <a:rPr lang="ko-KR" altLang="en-US" dirty="0">
+                <a:latin typeface="배달의민족 도현" panose="020B0600000101010101" pitchFamily="50" charset="-127"/>
+                <a:ea typeface="배달의민족 도현" panose="020B0600000101010101" pitchFamily="50" charset="-127"/>
+              </a:rPr>
+            </a:br>
+            <a:r>
+              <a:rPr lang="ko-KR" altLang="en-US" dirty="0">
+                <a:latin typeface="배달의민족 도현" panose="020B0600000101010101" pitchFamily="50" charset="-127"/>
+                <a:ea typeface="배달의민족 도현" panose="020B0600000101010101" pitchFamily="50" charset="-127"/>
+              </a:rPr>
+              <a:t/>
+            </a:r>
+            <a:br>
+              <a:rPr lang="ko-KR" altLang="en-US" dirty="0">
+                <a:latin typeface="배달의민족 도현" panose="020B0600000101010101" pitchFamily="50" charset="-127"/>
+                <a:ea typeface="배달의민족 도현" panose="020B0600000101010101" pitchFamily="50" charset="-127"/>
+              </a:rPr>
+            </a:br>
+            <a:r>
+              <a:rPr lang="ko-KR" altLang="en-US" dirty="0">
+                <a:latin typeface="배달의민족 도현" panose="020B0600000101010101" pitchFamily="50" charset="-127"/>
+                <a:ea typeface="배달의민족 도현" panose="020B0600000101010101" pitchFamily="50" charset="-127"/>
+              </a:rPr>
+              <a:t>프로그램을 단순히 데이터와 처리 방법으로 나누는 것이 아니라</a:t>
+            </a:r>
+            <a:r>
+              <a:rPr lang="en-US" altLang="ko-KR" dirty="0">
+                <a:latin typeface="배달의민족 도현" panose="020B0600000101010101" pitchFamily="50" charset="-127"/>
+                <a:ea typeface="배달의민족 도현" panose="020B0600000101010101" pitchFamily="50" charset="-127"/>
+              </a:rPr>
+              <a:t>, </a:t>
+            </a:r>
+            <a:r>
+              <a:rPr lang="ko-KR" altLang="en-US" dirty="0">
+                <a:latin typeface="배달의민족 도현" panose="020B0600000101010101" pitchFamily="50" charset="-127"/>
+                <a:ea typeface="배달의민족 도현" panose="020B0600000101010101" pitchFamily="50" charset="-127"/>
+              </a:rPr>
+              <a:t>프로그램을 수많은 </a:t>
+            </a:r>
+            <a:r>
+              <a:rPr lang="en-US" altLang="ko-KR" dirty="0">
+                <a:latin typeface="배달의민족 도현" panose="020B0600000101010101" pitchFamily="50" charset="-127"/>
+                <a:ea typeface="배달의민족 도현" panose="020B0600000101010101" pitchFamily="50" charset="-127"/>
+              </a:rPr>
+              <a:t>'</a:t>
+            </a:r>
+            <a:r>
+              <a:rPr lang="ko-KR" altLang="en-US" dirty="0">
+                <a:latin typeface="배달의민족 도현" panose="020B0600000101010101" pitchFamily="50" charset="-127"/>
+                <a:ea typeface="배달의민족 도현" panose="020B0600000101010101" pitchFamily="50" charset="-127"/>
+              </a:rPr>
+              <a:t>객체</a:t>
+            </a:r>
+            <a:r>
+              <a:rPr lang="en-US" altLang="ko-KR" dirty="0">
+                <a:latin typeface="배달의민족 도현" panose="020B0600000101010101" pitchFamily="50" charset="-127"/>
+                <a:ea typeface="배달의민족 도현" panose="020B0600000101010101" pitchFamily="50" charset="-127"/>
+              </a:rPr>
+              <a:t>'</a:t>
+            </a:r>
+            <a:r>
+              <a:rPr lang="ko-KR" altLang="en-US" dirty="0">
+                <a:latin typeface="배달의민족 도현" panose="020B0600000101010101" pitchFamily="50" charset="-127"/>
+                <a:ea typeface="배달의민족 도현" panose="020B0600000101010101" pitchFamily="50" charset="-127"/>
+              </a:rPr>
+              <a:t>라는 기본 단위로 나누고 이 객체들의 상호작용으로 서술하는 방식이다</a:t>
+            </a:r>
+            <a:r>
+              <a:rPr lang="en-US" altLang="ko-KR" dirty="0">
+                <a:latin typeface="배달의민족 도현" panose="020B0600000101010101" pitchFamily="50" charset="-127"/>
+                <a:ea typeface="배달의민족 도현" panose="020B0600000101010101" pitchFamily="50" charset="-127"/>
+              </a:rPr>
+              <a:t>. </a:t>
+            </a:r>
+            <a:r>
+              <a:rPr lang="ko-KR" altLang="en-US" dirty="0">
+                <a:latin typeface="배달의민족 도현" panose="020B0600000101010101" pitchFamily="50" charset="-127"/>
+                <a:ea typeface="배달의민족 도현" panose="020B0600000101010101" pitchFamily="50" charset="-127"/>
+              </a:rPr>
+              <a:t>객체란 하나의 역할을 수행하는 </a:t>
+            </a:r>
+            <a:r>
+              <a:rPr lang="en-US" altLang="ko-KR" dirty="0">
+                <a:latin typeface="배달의민족 도현" panose="020B0600000101010101" pitchFamily="50" charset="-127"/>
+                <a:ea typeface="배달의민족 도현" panose="020B0600000101010101" pitchFamily="50" charset="-127"/>
+              </a:rPr>
+              <a:t>'</a:t>
+            </a:r>
+            <a:r>
+              <a:rPr lang="ko-KR" altLang="en-US" dirty="0" err="1">
+                <a:latin typeface="배달의민족 도현" panose="020B0600000101010101" pitchFamily="50" charset="-127"/>
+                <a:ea typeface="배달의민족 도현" panose="020B0600000101010101" pitchFamily="50" charset="-127"/>
+              </a:rPr>
+              <a:t>메소드와</a:t>
+            </a:r>
+            <a:r>
+              <a:rPr lang="ko-KR" altLang="en-US" dirty="0">
+                <a:latin typeface="배달의민족 도현" panose="020B0600000101010101" pitchFamily="50" charset="-127"/>
+                <a:ea typeface="배달의민족 도현" panose="020B0600000101010101" pitchFamily="50" charset="-127"/>
+              </a:rPr>
+              <a:t> 변수</a:t>
+            </a:r>
+            <a:r>
+              <a:rPr lang="en-US" altLang="ko-KR" dirty="0">
+                <a:latin typeface="배달의민족 도현" panose="020B0600000101010101" pitchFamily="50" charset="-127"/>
+                <a:ea typeface="배달의민족 도현" panose="020B0600000101010101" pitchFamily="50" charset="-127"/>
+              </a:rPr>
+              <a:t>(</a:t>
+            </a:r>
+            <a:r>
+              <a:rPr lang="ko-KR" altLang="en-US" dirty="0">
+                <a:latin typeface="배달의민족 도현" panose="020B0600000101010101" pitchFamily="50" charset="-127"/>
+                <a:ea typeface="배달의민족 도현" panose="020B0600000101010101" pitchFamily="50" charset="-127"/>
+              </a:rPr>
+              <a:t>데이터</a:t>
+            </a:r>
+            <a:r>
+              <a:rPr lang="en-US" altLang="ko-KR" dirty="0">
+                <a:latin typeface="배달의민족 도현" panose="020B0600000101010101" pitchFamily="50" charset="-127"/>
+                <a:ea typeface="배달의민족 도현" panose="020B0600000101010101" pitchFamily="50" charset="-127"/>
+              </a:rPr>
+              <a:t>)'</a:t>
+            </a:r>
+            <a:r>
+              <a:rPr lang="ko-KR" altLang="en-US" dirty="0">
+                <a:latin typeface="배달의민족 도현" panose="020B0600000101010101" pitchFamily="50" charset="-127"/>
+                <a:ea typeface="배달의민족 도현" panose="020B0600000101010101" pitchFamily="50" charset="-127"/>
+              </a:rPr>
+              <a:t>의 묶음으로 봐야 한다</a:t>
+            </a:r>
+            <a:r>
+              <a:rPr lang="en-US" altLang="ko-KR" dirty="0">
+                <a:latin typeface="배달의민족 도현" panose="020B0600000101010101" pitchFamily="50" charset="-127"/>
+                <a:ea typeface="배달의민족 도현" panose="020B0600000101010101" pitchFamily="50" charset="-127"/>
+              </a:rPr>
+              <a:t>.</a:t>
+            </a:r>
+            <a:endParaRPr lang="ko-KR" altLang="en-US" dirty="0">
               <a:latin typeface="배달의민족 도현" panose="020B0600000101010101" pitchFamily="50" charset="-127"/>
               <a:ea typeface="배달의민족 도현" panose="020B0600000101010101" pitchFamily="50" charset="-127"/>
             </a:endParaRPr>
@@ -4040,14 +6804,68 @@
       </p:sp>
       <p:sp>
         <p:nvSpPr>
-          <p:cNvPr id="3" name="TextBox 2"/>
+          <p:cNvPr id="5" name="오른쪽 화살표 4"/>
+          <p:cNvSpPr/>
+          <p:nvPr/>
+        </p:nvSpPr>
+        <p:spPr>
+          <a:xfrm rot="5400000">
+            <a:off x="5318892" y="4185235"/>
+            <a:ext cx="912375" cy="548640"/>
+          </a:xfrm>
+          <a:prstGeom prst="rightArrow">
+            <a:avLst>
+              <a:gd name="adj1" fmla="val 31818"/>
+              <a:gd name="adj2" fmla="val 50000"/>
+            </a:avLst>
+          </a:prstGeom>
+          <a:solidFill>
+            <a:srgbClr val="0070C0"/>
+          </a:solidFill>
+          <a:ln>
+            <a:solidFill>
+              <a:srgbClr val="0070C0"/>
+            </a:solidFill>
+          </a:ln>
+        </p:spPr>
+        <p:style>
+          <a:lnRef idx="2">
+            <a:schemeClr val="accent1">
+              <a:shade val="50000"/>
+            </a:schemeClr>
+          </a:lnRef>
+          <a:fillRef idx="1">
+            <a:schemeClr val="accent1"/>
+          </a:fillRef>
+          <a:effectRef idx="0">
+            <a:schemeClr val="accent1"/>
+          </a:effectRef>
+          <a:fontRef idx="minor">
+            <a:schemeClr val="lt1"/>
+          </a:fontRef>
+        </p:style>
+        <p:txBody>
+          <a:bodyPr rtlCol="0" anchor="ctr"/>
+          <a:lstStyle/>
+          <a:p>
+            <a:pPr algn="ctr"/>
+            <a:endParaRPr lang="ko-KR" altLang="en-US" dirty="0">
+              <a:latin typeface="배달의민족 도현" panose="020B0600000101010101" pitchFamily="50" charset="-127"/>
+              <a:ea typeface="배달의민족 도현" panose="020B0600000101010101" pitchFamily="50" charset="-127"/>
+            </a:endParaRPr>
+          </a:p>
+        </p:txBody>
+      </p:sp>
+      <p:sp>
+        <p:nvSpPr>
+          <p:cNvPr id="6" name="TextBox 5"/>
           <p:cNvSpPr txBox="1"/>
           <p:nvPr/>
         </p:nvSpPr>
         <p:spPr>
           <a:xfrm>
-            <a:off x="753980" y="1523999"/>
-            <a:ext cx="1678665" cy="523220"/>
+            <a:off x="2434002" y="5310554"/>
+            <a:ext cx="6682153" cy="369332"/>
           </a:xfrm>
           <a:prstGeom prst="rect">
             <a:avLst/>
@@ -4055,19 +6873,33 @@
           <a:noFill/>
         </p:spPr>
         <p:txBody>
-          <a:bodyPr wrap="none" rtlCol="0">
+          <a:bodyPr wrap="square" rtlCol="0">
             <a:spAutoFit/>
           </a:bodyPr>
           <a:lstStyle/>
           <a:p>
             <a:r>
-              <a:rPr lang="ko-KR" altLang="en-US" sz="2800" dirty="0" smtClean="0">
-                <a:latin typeface="배달의민족 도현" panose="020B0600000101010101" pitchFamily="50" charset="-127"/>
-                <a:ea typeface="배달의민족 도현" panose="020B0600000101010101" pitchFamily="50" charset="-127"/>
-              </a:rPr>
-              <a:t>객체 설명</a:t>
-            </a:r>
-            <a:endParaRPr lang="ko-KR" altLang="en-US" sz="2800" dirty="0">
+              <a:rPr lang="en-US" altLang="ko-KR" dirty="0" smtClean="0">
+                <a:latin typeface="배달의민족 도현" panose="020B0600000101010101" pitchFamily="50" charset="-127"/>
+                <a:ea typeface="배달의민족 도현" panose="020B0600000101010101" pitchFamily="50" charset="-127"/>
+              </a:rPr>
+              <a:t>“</a:t>
+            </a:r>
+            <a:r>
+              <a:rPr lang="ko-KR" altLang="en-US" dirty="0" smtClean="0">
+                <a:latin typeface="배달의민족 도현" panose="020B0600000101010101" pitchFamily="50" charset="-127"/>
+                <a:ea typeface="배달의민족 도현" panose="020B0600000101010101" pitchFamily="50" charset="-127"/>
+              </a:rPr>
+              <a:t>코드나 기능을 객체로 만드는 것을 지향하는 프로그래밍 기법</a:t>
+            </a:r>
+            <a:r>
+              <a:rPr lang="en-US" altLang="ko-KR" dirty="0" smtClean="0">
+                <a:latin typeface="배달의민족 도현" panose="020B0600000101010101" pitchFamily="50" charset="-127"/>
+                <a:ea typeface="배달의민족 도현" panose="020B0600000101010101" pitchFamily="50" charset="-127"/>
+              </a:rPr>
+              <a:t>”</a:t>
+            </a:r>
+            <a:endParaRPr lang="ko-KR" altLang="en-US" dirty="0">
               <a:latin typeface="배달의민족 도현" panose="020B0600000101010101" pitchFamily="50" charset="-127"/>
               <a:ea typeface="배달의민족 도현" panose="020B0600000101010101" pitchFamily="50" charset="-127"/>
             </a:endParaRPr>
@@ -4082,8 +6914,8 @@
         </p:nvSpPr>
         <p:spPr>
           <a:xfrm>
-            <a:off x="946484" y="2145908"/>
-            <a:ext cx="1390124" cy="1015663"/>
+            <a:off x="10119360" y="5852160"/>
+            <a:ext cx="2072640" cy="646331"/>
           </a:xfrm>
           <a:prstGeom prst="rect">
             <a:avLst/>
@@ -4091,42 +6923,56 @@
           <a:noFill/>
         </p:spPr>
         <p:txBody>
-          <a:bodyPr wrap="none" rtlCol="0">
+          <a:bodyPr wrap="square" rtlCol="0">
             <a:spAutoFit/>
           </a:bodyPr>
           <a:lstStyle/>
           <a:p>
-            <a:pPr marL="342900" indent="-342900">
-              <a:lnSpc>
-                <a:spcPct val="150000"/>
-              </a:lnSpc>
-              <a:buFontTx/>
-              <a:buChar char="-"/>
-            </a:pPr>
-            <a:r>
-              <a:rPr lang="en-US" altLang="ko-KR" sz="2000" dirty="0" smtClean="0">
-                <a:latin typeface="배달의민족 도현" panose="020B0600000101010101" pitchFamily="50" charset="-127"/>
-                <a:ea typeface="배달의민족 도현" panose="020B0600000101010101" pitchFamily="50" charset="-127"/>
-              </a:rPr>
-              <a:t>Intent </a:t>
-            </a:r>
-          </a:p>
-          <a:p>
-            <a:pPr marL="342900" indent="-342900">
-              <a:lnSpc>
-                <a:spcPct val="150000"/>
-              </a:lnSpc>
-              <a:buFontTx/>
-              <a:buChar char="-"/>
-            </a:pPr>
-            <a:r>
-              <a:rPr lang="en-US" altLang="ko-KR" sz="2000" dirty="0" smtClean="0">
-                <a:latin typeface="배달의민족 도현" panose="020B0600000101010101" pitchFamily="50" charset="-127"/>
-                <a:ea typeface="배달의민족 도현" panose="020B0600000101010101" pitchFamily="50" charset="-127"/>
-              </a:rPr>
-              <a:t>Toast</a:t>
-            </a:r>
-            <a:endParaRPr lang="ko-KR" altLang="en-US" sz="2000" dirty="0">
+            <a:r>
+              <a:rPr lang="ko-KR" altLang="en-US" dirty="0" smtClean="0">
+                <a:latin typeface="배달의민족 도현" panose="020B0600000101010101" pitchFamily="50" charset="-127"/>
+                <a:ea typeface="배달의민족 도현" panose="020B0600000101010101" pitchFamily="50" charset="-127"/>
+              </a:rPr>
+              <a:t>객체</a:t>
+            </a:r>
+            <a:r>
+              <a:rPr lang="en-US" altLang="ko-KR" dirty="0" smtClean="0">
+                <a:latin typeface="배달의민족 도현" panose="020B0600000101010101" pitchFamily="50" charset="-127"/>
+                <a:ea typeface="배달의민족 도현" panose="020B0600000101010101" pitchFamily="50" charset="-127"/>
+              </a:rPr>
+              <a:t>? </a:t>
+            </a:r>
+            <a:r>
+              <a:rPr lang="ko-KR" altLang="en-US" dirty="0" smtClean="0">
+                <a:latin typeface="배달의민족 도현" panose="020B0600000101010101" pitchFamily="50" charset="-127"/>
+                <a:ea typeface="배달의민족 도현" panose="020B0600000101010101" pitchFamily="50" charset="-127"/>
+              </a:rPr>
+              <a:t>클래스</a:t>
+            </a:r>
+            <a:r>
+              <a:rPr lang="en-US" altLang="ko-KR" dirty="0" smtClean="0">
+                <a:latin typeface="배달의민족 도현" panose="020B0600000101010101" pitchFamily="50" charset="-127"/>
+                <a:ea typeface="배달의민족 도현" panose="020B0600000101010101" pitchFamily="50" charset="-127"/>
+              </a:rPr>
+              <a:t>?</a:t>
+            </a:r>
+          </a:p>
+          <a:p>
+            <a:r>
+              <a:rPr lang="en-US" altLang="ko-KR" dirty="0" smtClean="0">
+                <a:latin typeface="배달의민족 도현" panose="020B0600000101010101" pitchFamily="50" charset="-127"/>
+                <a:ea typeface="배달의민족 도현" panose="020B0600000101010101" pitchFamily="50" charset="-127"/>
+              </a:rPr>
+              <a:t>&gt; </a:t>
+            </a:r>
+            <a:r>
+              <a:rPr lang="ko-KR" altLang="en-US" dirty="0" smtClean="0">
+                <a:latin typeface="배달의민족 도현" panose="020B0600000101010101" pitchFamily="50" charset="-127"/>
+                <a:ea typeface="배달의민족 도현" panose="020B0600000101010101" pitchFamily="50" charset="-127"/>
+              </a:rPr>
+              <a:t>나중에 설명</a:t>
+            </a:r>
+            <a:endParaRPr lang="ko-KR" altLang="en-US" dirty="0">
               <a:latin typeface="배달의민족 도현" panose="020B0600000101010101" pitchFamily="50" charset="-127"/>
               <a:ea typeface="배달의민족 도현" panose="020B0600000101010101" pitchFamily="50" charset="-127"/>
             </a:endParaRPr>
@@ -4135,14 +6981,14 @@
       </p:sp>
       <p:sp>
         <p:nvSpPr>
-          <p:cNvPr id="5" name="TextBox 4"/>
+          <p:cNvPr id="7" name="TextBox 6"/>
           <p:cNvSpPr txBox="1"/>
           <p:nvPr/>
         </p:nvSpPr>
         <p:spPr>
           <a:xfrm>
-            <a:off x="753980" y="3809999"/>
-            <a:ext cx="1781257" cy="523220"/>
+            <a:off x="8961120" y="3761821"/>
+            <a:ext cx="1879600" cy="369332"/>
           </a:xfrm>
           <a:prstGeom prst="rect">
             <a:avLst/>
@@ -4150,122 +6996,43 @@
           <a:noFill/>
         </p:spPr>
         <p:txBody>
-          <a:bodyPr wrap="none" rtlCol="0">
+          <a:bodyPr wrap="square" rtlCol="0">
             <a:spAutoFit/>
           </a:bodyPr>
           <a:lstStyle/>
           <a:p>
             <a:r>
-              <a:rPr lang="en-US" altLang="ko-KR" sz="2800" dirty="0" err="1" smtClean="0">
-                <a:latin typeface="배달의민족 도현" panose="020B0600000101010101" pitchFamily="50" charset="-127"/>
-                <a:ea typeface="배달의민족 도현" panose="020B0600000101010101" pitchFamily="50" charset="-127"/>
-              </a:rPr>
-              <a:t>XmlCode</a:t>
-            </a:r>
-            <a:endParaRPr lang="ko-KR" altLang="en-US" sz="2800" dirty="0">
+              <a:rPr lang="ko-KR" altLang="en-US" dirty="0" smtClean="0">
+                <a:latin typeface="배달의민족 도현" panose="020B0600000101010101" pitchFamily="50" charset="-127"/>
+                <a:ea typeface="배달의민족 도현" panose="020B0600000101010101" pitchFamily="50" charset="-127"/>
+              </a:rPr>
+              <a:t>출처</a:t>
+            </a:r>
+            <a:r>
+              <a:rPr lang="en-US" altLang="ko-KR" dirty="0" smtClean="0">
+                <a:latin typeface="배달의민족 도현" panose="020B0600000101010101" pitchFamily="50" charset="-127"/>
+                <a:ea typeface="배달의민족 도현" panose="020B0600000101010101" pitchFamily="50" charset="-127"/>
+              </a:rPr>
+              <a:t>: </a:t>
+            </a:r>
+            <a:r>
+              <a:rPr lang="ko-KR" altLang="en-US" dirty="0" smtClean="0">
+                <a:latin typeface="배달의민족 도현" panose="020B0600000101010101" pitchFamily="50" charset="-127"/>
+                <a:ea typeface="배달의민족 도현" panose="020B0600000101010101" pitchFamily="50" charset="-127"/>
+              </a:rPr>
+              <a:t>위키백과</a:t>
+            </a:r>
+            <a:endParaRPr lang="ko-KR" altLang="en-US" dirty="0">
               <a:latin typeface="배달의민족 도현" panose="020B0600000101010101" pitchFamily="50" charset="-127"/>
               <a:ea typeface="배달의민족 도현" panose="020B0600000101010101" pitchFamily="50" charset="-127"/>
             </a:endParaRPr>
           </a:p>
         </p:txBody>
       </p:sp>
-      <p:sp>
-        <p:nvSpPr>
-          <p:cNvPr id="6" name="TextBox 5"/>
-          <p:cNvSpPr txBox="1"/>
-          <p:nvPr/>
-        </p:nvSpPr>
-        <p:spPr>
-          <a:xfrm>
-            <a:off x="946484" y="4436371"/>
-            <a:ext cx="1837362" cy="1477328"/>
-          </a:xfrm>
-          <a:prstGeom prst="rect">
-            <a:avLst/>
-          </a:prstGeom>
-          <a:noFill/>
-        </p:spPr>
-        <p:txBody>
-          <a:bodyPr wrap="none" rtlCol="0">
-            <a:spAutoFit/>
-          </a:bodyPr>
-          <a:lstStyle/>
-          <a:p>
-            <a:pPr marL="342900" indent="-342900">
-              <a:lnSpc>
-                <a:spcPct val="150000"/>
-              </a:lnSpc>
-              <a:buFontTx/>
-              <a:buChar char="-"/>
-            </a:pPr>
-            <a:r>
-              <a:rPr lang="en-US" altLang="ko-KR" sz="2000" dirty="0" smtClean="0">
-                <a:latin typeface="배달의민족 도현" panose="020B0600000101010101" pitchFamily="50" charset="-127"/>
-                <a:ea typeface="배달의민족 도현" panose="020B0600000101010101" pitchFamily="50" charset="-127"/>
-              </a:rPr>
-              <a:t>Button </a:t>
-            </a:r>
-          </a:p>
-          <a:p>
-            <a:pPr marL="342900" indent="-342900">
-              <a:lnSpc>
-                <a:spcPct val="150000"/>
-              </a:lnSpc>
-              <a:buFontTx/>
-              <a:buChar char="-"/>
-            </a:pPr>
-            <a:r>
-              <a:rPr lang="en-US" altLang="ko-KR" sz="2000" dirty="0" err="1">
-                <a:latin typeface="배달의민족 도현" panose="020B0600000101010101" pitchFamily="50" charset="-127"/>
-                <a:ea typeface="배달의민족 도현" panose="020B0600000101010101" pitchFamily="50" charset="-127"/>
-              </a:rPr>
-              <a:t>E</a:t>
-            </a:r>
-            <a:r>
-              <a:rPr lang="en-US" altLang="ko-KR" sz="2000" dirty="0" err="1" smtClean="0">
-                <a:latin typeface="배달의민족 도현" panose="020B0600000101010101" pitchFamily="50" charset="-127"/>
-                <a:ea typeface="배달의민족 도현" panose="020B0600000101010101" pitchFamily="50" charset="-127"/>
-              </a:rPr>
-              <a:t>ditText</a:t>
-            </a:r>
-            <a:endParaRPr lang="en-US" altLang="ko-KR" sz="2000" dirty="0">
-              <a:latin typeface="배달의민족 도현" panose="020B0600000101010101" pitchFamily="50" charset="-127"/>
-              <a:ea typeface="배달의민족 도현" panose="020B0600000101010101" pitchFamily="50" charset="-127"/>
-            </a:endParaRPr>
-          </a:p>
-          <a:p>
-            <a:pPr marL="342900" indent="-342900">
-              <a:lnSpc>
-                <a:spcPct val="150000"/>
-              </a:lnSpc>
-              <a:buFontTx/>
-              <a:buChar char="-"/>
-            </a:pPr>
-            <a:r>
-              <a:rPr lang="en-US" altLang="ko-KR" sz="2000" dirty="0" err="1" smtClean="0">
-                <a:latin typeface="배달의민족 도현" panose="020B0600000101010101" pitchFamily="50" charset="-127"/>
-                <a:ea typeface="배달의민족 도현" panose="020B0600000101010101" pitchFamily="50" charset="-127"/>
-              </a:rPr>
-              <a:t>TextView</a:t>
-            </a:r>
-            <a:r>
-              <a:rPr lang="en-US" altLang="ko-KR" sz="2000" dirty="0" smtClean="0">
-                <a:latin typeface="배달의민족 도현" panose="020B0600000101010101" pitchFamily="50" charset="-127"/>
-                <a:ea typeface="배달의민족 도현" panose="020B0600000101010101" pitchFamily="50" charset="-127"/>
-              </a:rPr>
-              <a:t> </a:t>
-            </a:r>
-            <a:endParaRPr lang="ko-KR" altLang="en-US" sz="2000" dirty="0">
-              <a:latin typeface="배달의민족 도현" panose="020B0600000101010101" pitchFamily="50" charset="-127"/>
-              <a:ea typeface="배달의민족 도현" panose="020B0600000101010101" pitchFamily="50" charset="-127"/>
-            </a:endParaRPr>
-          </a:p>
-        </p:txBody>
-      </p:sp>
     </p:spTree>
     <p:extLst>
       <p:ext uri="{BB962C8B-B14F-4D97-AF65-F5344CB8AC3E}">
-        <p14:creationId xmlns:p14="http://schemas.microsoft.com/office/powerpoint/2010/main" val="1310653949"/>
+        <p14:creationId xmlns:p14="http://schemas.microsoft.com/office/powerpoint/2010/main" val="1314148364"/>
       </p:ext>
     </p:extLst>
   </p:cSld>
@@ -4308,7 +7075,7 @@
         <p:spPr>
           <a:xfrm>
             <a:off x="336884" y="320842"/>
-            <a:ext cx="1757212" cy="461665"/>
+            <a:ext cx="1069524" cy="461665"/>
           </a:xfrm>
           <a:prstGeom prst="rect">
             <a:avLst/>
@@ -4322,14 +7089,14 @@
           <a:lstStyle/>
           <a:p>
             <a:r>
-              <a:rPr lang="ko-KR" altLang="en-US" sz="2400" dirty="0" smtClean="0">
+              <a:rPr lang="ko-KR" altLang="en-US" sz="2400" dirty="0" err="1" smtClean="0">
                 <a:solidFill>
                   <a:srgbClr val="A4C639"/>
                 </a:solidFill>
                 <a:latin typeface="배달의민족 도현" panose="020B0600000101010101" pitchFamily="50" charset="-127"/>
                 <a:ea typeface="배달의민족 도현" panose="020B0600000101010101" pitchFamily="50" charset="-127"/>
               </a:rPr>
-              <a:t>마지막 시간</a:t>
+              <a:t>자료형</a:t>
             </a:r>
             <a:endParaRPr lang="ko-KR" altLang="en-US" sz="2400" dirty="0">
               <a:solidFill>
@@ -4341,29 +7108,163 @@
           </a:p>
         </p:txBody>
       </p:sp>
+      <p:sp>
+        <p:nvSpPr>
+          <p:cNvPr id="4" name="TextBox 3"/>
+          <p:cNvSpPr txBox="1"/>
+          <p:nvPr/>
+        </p:nvSpPr>
+        <p:spPr>
+          <a:xfrm>
+            <a:off x="2954664" y="5294479"/>
+            <a:ext cx="343364" cy="369332"/>
+          </a:xfrm>
+          <a:prstGeom prst="rect">
+            <a:avLst/>
+          </a:prstGeom>
+          <a:noFill/>
+        </p:spPr>
+        <p:txBody>
+          <a:bodyPr wrap="none" rtlCol="0">
+            <a:spAutoFit/>
+          </a:bodyPr>
+          <a:lstStyle/>
+          <a:p>
+            <a:r>
+              <a:rPr lang="en-US" altLang="ko-KR" dirty="0" smtClean="0">
+                <a:latin typeface="배달의민족 도현" panose="020B0600000101010101" pitchFamily="50" charset="-127"/>
+                <a:ea typeface="배달의민족 도현" panose="020B0600000101010101" pitchFamily="50" charset="-127"/>
+              </a:rPr>
+              <a:t>C</a:t>
+            </a:r>
+            <a:endParaRPr lang="ko-KR" altLang="en-US" dirty="0">
+              <a:latin typeface="배달의민족 도현" panose="020B0600000101010101" pitchFamily="50" charset="-127"/>
+              <a:ea typeface="배달의민족 도현" panose="020B0600000101010101" pitchFamily="50" charset="-127"/>
+            </a:endParaRPr>
+          </a:p>
+        </p:txBody>
+      </p:sp>
+      <p:sp>
+        <p:nvSpPr>
+          <p:cNvPr id="5" name="TextBox 4"/>
+          <p:cNvSpPr txBox="1"/>
+          <p:nvPr/>
+        </p:nvSpPr>
+        <p:spPr>
+          <a:xfrm>
+            <a:off x="8211077" y="5298051"/>
+            <a:ext cx="784189" cy="369332"/>
+          </a:xfrm>
+          <a:prstGeom prst="rect">
+            <a:avLst/>
+          </a:prstGeom>
+          <a:noFill/>
+        </p:spPr>
+        <p:txBody>
+          <a:bodyPr wrap="none" rtlCol="0">
+            <a:spAutoFit/>
+          </a:bodyPr>
+          <a:lstStyle/>
+          <a:p>
+            <a:r>
+              <a:rPr lang="en-US" altLang="ko-KR" dirty="0" smtClean="0">
+                <a:latin typeface="배달의민족 도현" panose="020B0600000101010101" pitchFamily="50" charset="-127"/>
+                <a:ea typeface="배달의민족 도현" panose="020B0600000101010101" pitchFamily="50" charset="-127"/>
+              </a:rPr>
+              <a:t>JAVA</a:t>
+            </a:r>
+            <a:endParaRPr lang="ko-KR" altLang="en-US" dirty="0">
+              <a:latin typeface="배달의민족 도현" panose="020B0600000101010101" pitchFamily="50" charset="-127"/>
+              <a:ea typeface="배달의민족 도현" panose="020B0600000101010101" pitchFamily="50" charset="-127"/>
+            </a:endParaRPr>
+          </a:p>
+        </p:txBody>
+      </p:sp>
       <p:pic>
         <p:nvPicPr>
-          <p:cNvPr id="4" name="그림 3"/>
+          <p:cNvPr id="3" name="그림 2"/>
           <p:cNvPicPr>
             <a:picLocks noChangeAspect="1"/>
           </p:cNvPicPr>
           <p:nvPr/>
         </p:nvPicPr>
-        <p:blipFill rotWithShape="1">
+        <p:blipFill>
           <a:blip r:embed="rId2"/>
-          <a:srcRect r="1190"/>
-          <a:stretch/>
+          <a:stretch>
+            <a:fillRect/>
+          </a:stretch>
         </p:blipFill>
         <p:spPr>
           <a:xfrm>
-            <a:off x="1253160" y="1330741"/>
-            <a:ext cx="2753575" cy="4909637"/>
+            <a:off x="6888902" y="3009646"/>
+            <a:ext cx="3329986" cy="824414"/>
           </a:xfrm>
           <a:prstGeom prst="rect">
             <a:avLst/>
           </a:prstGeom>
         </p:spPr>
       </p:pic>
+      <p:pic>
+        <p:nvPicPr>
+          <p:cNvPr id="6" name="그림 5"/>
+          <p:cNvPicPr>
+            <a:picLocks noChangeAspect="1"/>
+          </p:cNvPicPr>
+          <p:nvPr/>
+        </p:nvPicPr>
+        <p:blipFill>
+          <a:blip r:embed="rId3"/>
+          <a:stretch>
+            <a:fillRect/>
+          </a:stretch>
+        </p:blipFill>
+        <p:spPr>
+          <a:xfrm>
+            <a:off x="1344700" y="3056363"/>
+            <a:ext cx="3550468" cy="730979"/>
+          </a:xfrm>
+          <a:prstGeom prst="rect">
+            <a:avLst/>
+          </a:prstGeom>
+        </p:spPr>
+      </p:pic>
+    </p:spTree>
+    <p:extLst>
+      <p:ext uri="{BB962C8B-B14F-4D97-AF65-F5344CB8AC3E}">
+        <p14:creationId xmlns:p14="http://schemas.microsoft.com/office/powerpoint/2010/main" val="477322337"/>
+      </p:ext>
+    </p:extLst>
+  </p:cSld>
+  <p:clrMapOvr>
+    <a:masterClrMapping/>
+  </p:clrMapOvr>
+  <p:timing>
+    <p:tnLst>
+      <p:par>
+        <p:cTn id="1" dur="indefinite" restart="never" nodeType="tmRoot"/>
+      </p:par>
+    </p:tnLst>
+  </p:timing>
+</p:sld>
+</file>
+
+<file path=ppt/slides/slide8.xml><?xml version="1.0" encoding="utf-8"?>
+<p:sld xmlns:a="http://schemas.openxmlformats.org/drawingml/2006/main" xmlns:r="http://schemas.openxmlformats.org/officeDocument/2006/relationships" xmlns:p="http://schemas.openxmlformats.org/presentationml/2006/main">
+  <p:cSld>
+    <p:spTree>
+      <p:nvGrpSpPr>
+        <p:cNvPr id="1" name=""/>
+        <p:cNvGrpSpPr/>
+        <p:nvPr/>
+      </p:nvGrpSpPr>
+      <p:grpSpPr>
+        <a:xfrm>
+          <a:off x="0" y="0"/>
+          <a:ext cx="0" cy="0"/>
+          <a:chOff x="0" y="0"/>
+          <a:chExt cx="0" cy="0"/>
+        </a:xfrm>
+      </p:grpSpPr>
       <p:pic>
         <p:nvPicPr>
           <p:cNvPr id="7" name="그림 6"/>
@@ -4373,7 +7274,268 @@
           <p:nvPr/>
         </p:nvPicPr>
         <p:blipFill>
-          <a:blip r:embed="rId3" cstate="print">
+          <a:blip r:embed="rId2"/>
+          <a:stretch>
+            <a:fillRect/>
+          </a:stretch>
+        </p:blipFill>
+        <p:spPr>
+          <a:xfrm>
+            <a:off x="1335422" y="3158797"/>
+            <a:ext cx="3569023" cy="526111"/>
+          </a:xfrm>
+          <a:prstGeom prst="rect">
+            <a:avLst/>
+          </a:prstGeom>
+        </p:spPr>
+      </p:pic>
+      <p:sp>
+        <p:nvSpPr>
+          <p:cNvPr id="2" name="TextBox 1"/>
+          <p:cNvSpPr txBox="1"/>
+          <p:nvPr/>
+        </p:nvSpPr>
+        <p:spPr>
+          <a:xfrm>
+            <a:off x="336884" y="320842"/>
+            <a:ext cx="1069524" cy="461665"/>
+          </a:xfrm>
+          <a:prstGeom prst="rect">
+            <a:avLst/>
+          </a:prstGeom>
+          <a:noFill/>
+        </p:spPr>
+        <p:txBody>
+          <a:bodyPr wrap="none" rtlCol="0">
+            <a:spAutoFit/>
+          </a:bodyPr>
+          <a:lstStyle/>
+          <a:p>
+            <a:r>
+              <a:rPr lang="ko-KR" altLang="en-US" sz="2400" dirty="0" err="1" smtClean="0">
+                <a:solidFill>
+                  <a:srgbClr val="A4C639"/>
+                </a:solidFill>
+                <a:latin typeface="배달의민족 도현" panose="020B0600000101010101" pitchFamily="50" charset="-127"/>
+                <a:ea typeface="배달의민족 도현" panose="020B0600000101010101" pitchFamily="50" charset="-127"/>
+              </a:rPr>
+              <a:t>자료형</a:t>
+            </a:r>
+            <a:endParaRPr lang="ko-KR" altLang="en-US" sz="2400" dirty="0">
+              <a:solidFill>
+                <a:srgbClr val="A4C639"/>
+              </a:solidFill>
+              <a:latin typeface="배달의민족 도현" panose="020B0600000101010101" pitchFamily="50" charset="-127"/>
+              <a:ea typeface="배달의민족 도현" panose="020B0600000101010101" pitchFamily="50" charset="-127"/>
+            </a:endParaRPr>
+          </a:p>
+        </p:txBody>
+      </p:sp>
+      <p:sp>
+        <p:nvSpPr>
+          <p:cNvPr id="4" name="TextBox 3"/>
+          <p:cNvSpPr txBox="1"/>
+          <p:nvPr/>
+        </p:nvSpPr>
+        <p:spPr>
+          <a:xfrm>
+            <a:off x="2954664" y="5294479"/>
+            <a:ext cx="343364" cy="369332"/>
+          </a:xfrm>
+          <a:prstGeom prst="rect">
+            <a:avLst/>
+          </a:prstGeom>
+          <a:noFill/>
+        </p:spPr>
+        <p:txBody>
+          <a:bodyPr wrap="none" rtlCol="0">
+            <a:spAutoFit/>
+          </a:bodyPr>
+          <a:lstStyle/>
+          <a:p>
+            <a:r>
+              <a:rPr lang="en-US" altLang="ko-KR" dirty="0" smtClean="0">
+                <a:latin typeface="배달의민족 도현" panose="020B0600000101010101" pitchFamily="50" charset="-127"/>
+                <a:ea typeface="배달의민족 도현" panose="020B0600000101010101" pitchFamily="50" charset="-127"/>
+              </a:rPr>
+              <a:t>C</a:t>
+            </a:r>
+            <a:endParaRPr lang="ko-KR" altLang="en-US" dirty="0">
+              <a:latin typeface="배달의민족 도현" panose="020B0600000101010101" pitchFamily="50" charset="-127"/>
+              <a:ea typeface="배달의민족 도현" panose="020B0600000101010101" pitchFamily="50" charset="-127"/>
+            </a:endParaRPr>
+          </a:p>
+        </p:txBody>
+      </p:sp>
+      <p:sp>
+        <p:nvSpPr>
+          <p:cNvPr id="5" name="TextBox 4"/>
+          <p:cNvSpPr txBox="1"/>
+          <p:nvPr/>
+        </p:nvSpPr>
+        <p:spPr>
+          <a:xfrm>
+            <a:off x="8211077" y="5298051"/>
+            <a:ext cx="784189" cy="369332"/>
+          </a:xfrm>
+          <a:prstGeom prst="rect">
+            <a:avLst/>
+          </a:prstGeom>
+          <a:noFill/>
+        </p:spPr>
+        <p:txBody>
+          <a:bodyPr wrap="none" rtlCol="0">
+            <a:spAutoFit/>
+          </a:bodyPr>
+          <a:lstStyle/>
+          <a:p>
+            <a:r>
+              <a:rPr lang="en-US" altLang="ko-KR" dirty="0" smtClean="0">
+                <a:latin typeface="배달의민족 도현" panose="020B0600000101010101" pitchFamily="50" charset="-127"/>
+                <a:ea typeface="배달의민족 도현" panose="020B0600000101010101" pitchFamily="50" charset="-127"/>
+              </a:rPr>
+              <a:t>JAVA</a:t>
+            </a:r>
+            <a:endParaRPr lang="ko-KR" altLang="en-US" dirty="0">
+              <a:latin typeface="배달의민족 도현" panose="020B0600000101010101" pitchFamily="50" charset="-127"/>
+              <a:ea typeface="배달의민족 도현" panose="020B0600000101010101" pitchFamily="50" charset="-127"/>
+            </a:endParaRPr>
+          </a:p>
+        </p:txBody>
+      </p:sp>
+      <p:pic>
+        <p:nvPicPr>
+          <p:cNvPr id="8" name="그림 7"/>
+          <p:cNvPicPr>
+            <a:picLocks noChangeAspect="1"/>
+          </p:cNvPicPr>
+          <p:nvPr/>
+        </p:nvPicPr>
+        <p:blipFill>
+          <a:blip r:embed="rId3"/>
+          <a:stretch>
+            <a:fillRect/>
+          </a:stretch>
+        </p:blipFill>
+        <p:spPr>
+          <a:xfrm>
+            <a:off x="6852478" y="3158797"/>
+            <a:ext cx="3402833" cy="513970"/>
+          </a:xfrm>
+          <a:prstGeom prst="rect">
+            <a:avLst/>
+          </a:prstGeom>
+        </p:spPr>
+      </p:pic>
+    </p:spTree>
+    <p:extLst>
+      <p:ext uri="{BB962C8B-B14F-4D97-AF65-F5344CB8AC3E}">
+        <p14:creationId xmlns:p14="http://schemas.microsoft.com/office/powerpoint/2010/main" val="1243219138"/>
+      </p:ext>
+    </p:extLst>
+  </p:cSld>
+  <p:clrMapOvr>
+    <a:masterClrMapping/>
+  </p:clrMapOvr>
+  <p:timing>
+    <p:tnLst>
+      <p:par>
+        <p:cTn id="1" dur="indefinite" restart="never" nodeType="tmRoot"/>
+      </p:par>
+    </p:tnLst>
+  </p:timing>
+</p:sld>
+</file>
+
+<file path=ppt/slides/slide9.xml><?xml version="1.0" encoding="utf-8"?>
+<p:sld xmlns:a="http://schemas.openxmlformats.org/drawingml/2006/main" xmlns:r="http://schemas.openxmlformats.org/officeDocument/2006/relationships" xmlns:p="http://schemas.openxmlformats.org/presentationml/2006/main">
+  <p:cSld>
+    <p:spTree>
+      <p:nvGrpSpPr>
+        <p:cNvPr id="1" name=""/>
+        <p:cNvGrpSpPr/>
+        <p:nvPr/>
+      </p:nvGrpSpPr>
+      <p:grpSpPr>
+        <a:xfrm>
+          <a:off x="0" y="0"/>
+          <a:ext cx="0" cy="0"/>
+          <a:chOff x="0" y="0"/>
+          <a:chExt cx="0" cy="0"/>
+        </a:xfrm>
+      </p:grpSpPr>
+      <p:sp>
+        <p:nvSpPr>
+          <p:cNvPr id="2" name="TextBox 1"/>
+          <p:cNvSpPr txBox="1"/>
+          <p:nvPr/>
+        </p:nvSpPr>
+        <p:spPr>
+          <a:xfrm>
+            <a:off x="336884" y="320842"/>
+            <a:ext cx="2085827" cy="461665"/>
+          </a:xfrm>
+          <a:prstGeom prst="rect">
+            <a:avLst/>
+          </a:prstGeom>
+          <a:noFill/>
+        </p:spPr>
+        <p:txBody>
+          <a:bodyPr wrap="none" rtlCol="0">
+            <a:spAutoFit/>
+          </a:bodyPr>
+          <a:lstStyle/>
+          <a:p>
+            <a:r>
+              <a:rPr lang="ko-KR" altLang="en-US" sz="2400" dirty="0" smtClean="0">
+                <a:solidFill>
+                  <a:srgbClr val="A4C639"/>
+                </a:solidFill>
+                <a:latin typeface="배달의민족 도현" panose="020B0600000101010101" pitchFamily="50" charset="-127"/>
+                <a:ea typeface="배달의민족 도현" panose="020B0600000101010101" pitchFamily="50" charset="-127"/>
+              </a:rPr>
+              <a:t>클래스 </a:t>
+            </a:r>
+            <a:r>
+              <a:rPr lang="en-US" altLang="ko-KR" sz="2400" dirty="0" smtClean="0">
+                <a:solidFill>
+                  <a:srgbClr val="A4C639"/>
+                </a:solidFill>
+                <a:latin typeface="배달의민족 도현" panose="020B0600000101010101" pitchFamily="50" charset="-127"/>
+                <a:ea typeface="배달의민족 도현" panose="020B0600000101010101" pitchFamily="50" charset="-127"/>
+              </a:rPr>
+              <a:t>&amp; </a:t>
+            </a:r>
+            <a:r>
+              <a:rPr lang="ko-KR" altLang="en-US" sz="2400" dirty="0" smtClean="0">
+                <a:solidFill>
+                  <a:srgbClr val="A4C639"/>
+                </a:solidFill>
+                <a:latin typeface="배달의민족 도현" panose="020B0600000101010101" pitchFamily="50" charset="-127"/>
+                <a:ea typeface="배달의민족 도현" panose="020B0600000101010101" pitchFamily="50" charset="-127"/>
+              </a:rPr>
+              <a:t>객체</a:t>
+            </a:r>
+            <a:endParaRPr lang="ko-KR" altLang="en-US" sz="2400" dirty="0">
+              <a:solidFill>
+                <a:srgbClr val="A4C639"/>
+              </a:solidFill>
+              <a:latin typeface="배달의민족 도현" panose="020B0600000101010101" pitchFamily="50" charset="-127"/>
+              <a:ea typeface="배달의민족 도현" panose="020B0600000101010101" pitchFamily="50" charset="-127"/>
+            </a:endParaRPr>
+          </a:p>
+        </p:txBody>
+      </p:sp>
+      <p:pic>
+        <p:nvPicPr>
+          <p:cNvPr id="3" name="그림 2"/>
+          <p:cNvPicPr>
+            <a:picLocks noChangeAspect="1"/>
+          </p:cNvPicPr>
+          <p:nvPr/>
+        </p:nvPicPr>
+        <p:blipFill>
+          <a:blip r:embed="rId2" cstate="print">
             <a:extLst>
               <a:ext uri="{28A0092B-C50C-407E-A947-70E740481C1C}">
                 <a14:useLocalDpi xmlns:a14="http://schemas.microsoft.com/office/drawing/2010/main" val="0"/>
@@ -4386,8 +7548,8 @@
         </p:blipFill>
         <p:spPr>
           <a:xfrm>
-            <a:off x="6871131" y="3383542"/>
-            <a:ext cx="931420" cy="931420"/>
+            <a:off x="1406408" y="1420090"/>
+            <a:ext cx="3532909" cy="3532909"/>
           </a:xfrm>
           <a:prstGeom prst="rect">
             <a:avLst/>
@@ -4396,14 +7558,14 @@
       </p:pic>
       <p:pic>
         <p:nvPicPr>
-          <p:cNvPr id="8" name="그림 7"/>
+          <p:cNvPr id="6" name="그림 5"/>
           <p:cNvPicPr>
             <a:picLocks noChangeAspect="1"/>
           </p:cNvPicPr>
           <p:nvPr/>
         </p:nvPicPr>
         <p:blipFill>
-          <a:blip r:embed="rId4" cstate="print">
+          <a:blip r:embed="rId3">
             <a:extLst>
               <a:ext uri="{28A0092B-C50C-407E-A947-70E740481C1C}">
                 <a14:useLocalDpi xmlns:a14="http://schemas.microsoft.com/office/drawing/2010/main" val="0"/>
@@ -4416,41 +7578,90 @@
         </p:blipFill>
         <p:spPr>
           <a:xfrm>
-            <a:off x="4722529" y="2573901"/>
-            <a:ext cx="2053389" cy="2053389"/>
+            <a:off x="6550618" y="1832750"/>
+            <a:ext cx="4058352" cy="2707587"/>
           </a:xfrm>
           <a:prstGeom prst="rect">
             <a:avLst/>
           </a:prstGeom>
         </p:spPr>
       </p:pic>
-      <p:pic>
-        <p:nvPicPr>
-          <p:cNvPr id="9" name="그림 8"/>
-          <p:cNvPicPr>
-            <a:picLocks noChangeAspect="1"/>
-          </p:cNvPicPr>
+      <p:sp>
+        <p:nvSpPr>
+          <p:cNvPr id="4" name="TextBox 3"/>
+          <p:cNvSpPr txBox="1"/>
           <p:nvPr/>
-        </p:nvPicPr>
-        <p:blipFill rotWithShape="1">
-          <a:blip r:embed="rId5"/>
-          <a:srcRect r="1638"/>
-          <a:stretch/>
-        </p:blipFill>
-        <p:spPr>
-          <a:xfrm>
-            <a:off x="8488151" y="1330740"/>
-            <a:ext cx="2675842" cy="4909637"/>
+        </p:nvSpPr>
+        <p:spPr>
+          <a:xfrm>
+            <a:off x="2734280" y="5221250"/>
+            <a:ext cx="877163" cy="369332"/>
           </a:xfrm>
           <a:prstGeom prst="rect">
             <a:avLst/>
           </a:prstGeom>
-        </p:spPr>
-      </p:pic>
+          <a:noFill/>
+        </p:spPr>
+        <p:txBody>
+          <a:bodyPr wrap="none" rtlCol="0">
+            <a:spAutoFit/>
+          </a:bodyPr>
+          <a:lstStyle/>
+          <a:p>
+            <a:r>
+              <a:rPr lang="ko-KR" altLang="en-US" dirty="0" smtClean="0">
+                <a:latin typeface="배달의민족 도현" panose="020B0600000101010101" pitchFamily="50" charset="-127"/>
+                <a:ea typeface="배달의민족 도현" panose="020B0600000101010101" pitchFamily="50" charset="-127"/>
+              </a:rPr>
+              <a:t>클래스</a:t>
+            </a:r>
+            <a:endParaRPr lang="ko-KR" altLang="en-US" dirty="0">
+              <a:latin typeface="배달의민족 도현" panose="020B0600000101010101" pitchFamily="50" charset="-127"/>
+              <a:ea typeface="배달의민족 도현" panose="020B0600000101010101" pitchFamily="50" charset="-127"/>
+            </a:endParaRPr>
+          </a:p>
+        </p:txBody>
+      </p:sp>
+      <p:sp>
+        <p:nvSpPr>
+          <p:cNvPr id="7" name="TextBox 6"/>
+          <p:cNvSpPr txBox="1"/>
+          <p:nvPr/>
+        </p:nvSpPr>
+        <p:spPr>
+          <a:xfrm>
+            <a:off x="8256628" y="5221250"/>
+            <a:ext cx="646331" cy="369332"/>
+          </a:xfrm>
+          <a:prstGeom prst="rect">
+            <a:avLst/>
+          </a:prstGeom>
+          <a:noFill/>
+        </p:spPr>
+        <p:txBody>
+          <a:bodyPr wrap="none" rtlCol="0">
+            <a:spAutoFit/>
+          </a:bodyPr>
+          <a:lstStyle/>
+          <a:p>
+            <a:r>
+              <a:rPr lang="ko-KR" altLang="en-US" dirty="0" smtClean="0">
+                <a:latin typeface="배달의민족 도현" panose="020B0600000101010101" pitchFamily="50" charset="-127"/>
+                <a:ea typeface="배달의민족 도현" panose="020B0600000101010101" pitchFamily="50" charset="-127"/>
+              </a:rPr>
+              <a:t>객체</a:t>
+            </a:r>
+            <a:endParaRPr lang="ko-KR" altLang="en-US" dirty="0">
+              <a:latin typeface="배달의민족 도현" panose="020B0600000101010101" pitchFamily="50" charset="-127"/>
+              <a:ea typeface="배달의민족 도현" panose="020B0600000101010101" pitchFamily="50" charset="-127"/>
+            </a:endParaRPr>
+          </a:p>
+        </p:txBody>
+      </p:sp>
     </p:spTree>
     <p:extLst>
       <p:ext uri="{BB962C8B-B14F-4D97-AF65-F5344CB8AC3E}">
-        <p14:creationId xmlns:p14="http://schemas.microsoft.com/office/powerpoint/2010/main" val="2188406272"/>
+        <p14:creationId xmlns:p14="http://schemas.microsoft.com/office/powerpoint/2010/main" val="3228465071"/>
       </p:ext>
     </p:extLst>
   </p:cSld>
@@ -4460,147 +7671,7 @@
   <p:timing>
     <p:tnLst>
       <p:par>
-        <p:cTn id="1" dur="indefinite" restart="never" nodeType="tmRoot">
-          <p:childTnLst>
-            <p:seq concurrent="1" nextAc="seek">
-              <p:cTn id="2" dur="indefinite" nodeType="mainSeq">
-                <p:childTnLst>
-                  <p:par>
-                    <p:cTn id="3" fill="hold">
-                      <p:stCondLst>
-                        <p:cond delay="indefinite"/>
-                      </p:stCondLst>
-                      <p:childTnLst>
-                        <p:par>
-                          <p:cTn id="4" fill="hold">
-                            <p:stCondLst>
-                              <p:cond delay="0"/>
-                            </p:stCondLst>
-                            <p:childTnLst>
-                              <p:par>
-                                <p:cTn id="5" presetID="1" presetClass="entr" presetSubtype="0" fill="hold" nodeType="clickEffect">
-                                  <p:stCondLst>
-                                    <p:cond delay="0"/>
-                                  </p:stCondLst>
-                                  <p:childTnLst>
-                                    <p:set>
-                                      <p:cBhvr>
-                                        <p:cTn id="6" dur="1" fill="hold">
-                                          <p:stCondLst>
-                                            <p:cond delay="0"/>
-                                          </p:stCondLst>
-                                        </p:cTn>
-                                        <p:tgtEl>
-                                          <p:spTgt spid="8"/>
-                                        </p:tgtEl>
-                                        <p:attrNameLst>
-                                          <p:attrName>style.visibility</p:attrName>
-                                        </p:attrNameLst>
-                                      </p:cBhvr>
-                                      <p:to>
-                                        <p:strVal val="visible"/>
-                                      </p:to>
-                                    </p:set>
-                                  </p:childTnLst>
-                                </p:cTn>
-                              </p:par>
-                              <p:par>
-                                <p:cTn id="7" presetID="1" presetClass="entr" presetSubtype="0" fill="hold" nodeType="withEffect">
-                                  <p:stCondLst>
-                                    <p:cond delay="0"/>
-                                  </p:stCondLst>
-                                  <p:childTnLst>
-                                    <p:set>
-                                      <p:cBhvr>
-                                        <p:cTn id="8" dur="1" fill="hold">
-                                          <p:stCondLst>
-                                            <p:cond delay="0"/>
-                                          </p:stCondLst>
-                                        </p:cTn>
-                                        <p:tgtEl>
-                                          <p:spTgt spid="7"/>
-                                        </p:tgtEl>
-                                        <p:attrNameLst>
-                                          <p:attrName>style.visibility</p:attrName>
-                                        </p:attrNameLst>
-                                      </p:cBhvr>
-                                      <p:to>
-                                        <p:strVal val="visible"/>
-                                      </p:to>
-                                    </p:set>
-                                  </p:childTnLst>
-                                </p:cTn>
-                              </p:par>
-                            </p:childTnLst>
-                          </p:cTn>
-                        </p:par>
-                      </p:childTnLst>
-                    </p:cTn>
-                  </p:par>
-                  <p:par>
-                    <p:cTn id="9" fill="hold">
-                      <p:stCondLst>
-                        <p:cond delay="indefinite"/>
-                      </p:stCondLst>
-                      <p:childTnLst>
-                        <p:par>
-                          <p:cTn id="10" fill="hold">
-                            <p:stCondLst>
-                              <p:cond delay="0"/>
-                            </p:stCondLst>
-                            <p:childTnLst>
-                              <p:par>
-                                <p:cTn id="11" presetID="1" presetClass="entr" presetSubtype="0" fill="hold" nodeType="clickEffect">
-                                  <p:stCondLst>
-                                    <p:cond delay="0"/>
-                                  </p:stCondLst>
-                                  <p:childTnLst>
-                                    <p:set>
-                                      <p:cBhvr>
-                                        <p:cTn id="12" dur="1" fill="hold">
-                                          <p:stCondLst>
-                                            <p:cond delay="0"/>
-                                          </p:stCondLst>
-                                        </p:cTn>
-                                        <p:tgtEl>
-                                          <p:spTgt spid="9"/>
-                                        </p:tgtEl>
-                                        <p:attrNameLst>
-                                          <p:attrName>style.visibility</p:attrName>
-                                        </p:attrNameLst>
-                                      </p:cBhvr>
-                                      <p:to>
-                                        <p:strVal val="visible"/>
-                                      </p:to>
-                                    </p:set>
-                                  </p:childTnLst>
-                                </p:cTn>
-                              </p:par>
-                            </p:childTnLst>
-                          </p:cTn>
-                        </p:par>
-                      </p:childTnLst>
-                    </p:cTn>
-                  </p:par>
-                </p:childTnLst>
-              </p:cTn>
-              <p:prevCondLst>
-                <p:cond evt="onPrev" delay="0">
-                  <p:tgtEl>
-                    <p:sldTgt/>
-                  </p:tgtEl>
-                </p:cond>
-              </p:prevCondLst>
-              <p:nextCondLst>
-                <p:cond evt="onNext" delay="0">
-                  <p:tgtEl>
-                    <p:sldTgt/>
-                  </p:tgtEl>
-                </p:cond>
-              </p:nextCondLst>
-            </p:seq>
-          </p:childTnLst>
-        </p:cTn>
+        <p:cTn id="1" dur="indefinite" restart="never" nodeType="tmRoot"/>
       </p:par>
     </p:tnLst>
   </p:timing>

</xml_diff>